<commit_message>
Minor rewording and typo corrections :)
</commit_message>
<xml_diff>
--- a/sprint-presentations/1119_WebApp_presentation.pptx
+++ b/sprint-presentations/1119_WebApp_presentation.pptx
@@ -27,26 +27,22 @@
   <p:notesSz cx="6858000" cy="9144000"/>
   <p:embeddedFontLst>
     <p:embeddedFont>
-      <p:font typeface="宋体" panose="02010600030101010101" pitchFamily="2" charset="-122"/>
+      <p:font typeface="Lato" panose="020F0502020204030203" pitchFamily="34" charset="77"/>
       <p:regular r:id="rId17"/>
     </p:embeddedFont>
     <p:embeddedFont>
-      <p:font typeface="Lato" panose="020F0502020204030203" pitchFamily="34" charset="0"/>
+      <p:font typeface="Lato Light" panose="020F0502020204030203" pitchFamily="34" charset="77"/>
       <p:regular r:id="rId18"/>
+      <p:bold r:id="rId19"/>
+      <p:italic r:id="rId20"/>
+      <p:boldItalic r:id="rId21"/>
     </p:embeddedFont>
     <p:embeddedFont>
-      <p:font typeface="Lato Hairline" panose="020B0604020202020204" charset="0"/>
-      <p:regular r:id="rId19"/>
-      <p:bold r:id="rId20"/>
-      <p:italic r:id="rId21"/>
-      <p:boldItalic r:id="rId22"/>
-    </p:embeddedFont>
-    <p:embeddedFont>
-      <p:font typeface="Lato Light" panose="020B0604020202020204" charset="0"/>
-      <p:regular r:id="rId23"/>
-      <p:bold r:id="rId24"/>
-      <p:italic r:id="rId25"/>
-      <p:boldItalic r:id="rId26"/>
+      <p:font typeface="Lato Hairline" panose="020F0502020204030203" pitchFamily="34" charset="77"/>
+      <p:regular r:id="rId22"/>
+      <p:bold r:id="rId23"/>
+      <p:italic r:id="rId24"/>
+      <p:boldItalic r:id="rId25"/>
     </p:embeddedFont>
   </p:embeddedFontLst>
   <p:defaultTextStyle>
@@ -6331,20 +6327,19 @@
                 <a:cs typeface="Lato Light"/>
                 <a:sym typeface="Lato Light"/>
               </a:rPr>
-              <a:t>L</a:t>
+              <a:t>Final</a:t>
             </a:r>
-            <a:r>
-              <a:rPr lang="en" dirty="0">
-                <a:solidFill>
-                  <a:srgbClr val="666666"/>
-                </a:solidFill>
-                <a:latin typeface="Lato Light"/>
-                <a:ea typeface="Lato Light"/>
-                <a:cs typeface="Lato Light"/>
-                <a:sym typeface="Lato Light"/>
-              </a:rPr>
-              <a:t>ast </a:t>
-            </a:r>
+          </a:p>
+          <a:p>
+            <a:pPr marL="0" lvl="0" indent="0" algn="ctr" rtl="0">
+              <a:spcBef>
+                <a:spcPts val="0"/>
+              </a:spcBef>
+              <a:spcAft>
+                <a:spcPts val="0"/>
+              </a:spcAft>
+              <a:buNone/>
+            </a:pPr>
             <a:r>
               <a:rPr lang="en-US" dirty="0">
                 <a:solidFill>
@@ -6448,16 +6443,10 @@
           </a:bodyPr>
           <a:lstStyle/>
           <a:p>
-            <a:pPr marL="285750" lvl="0" indent="-285750" rtl="0">
+            <a:pPr marL="285750" lvl="0" indent="-285750">
               <a:lnSpc>
                 <a:spcPct val="150000"/>
               </a:lnSpc>
-              <a:spcBef>
-                <a:spcPts val="0"/>
-              </a:spcBef>
-              <a:spcAft>
-                <a:spcPts val="0"/>
-              </a:spcAft>
               <a:buFont typeface="Arial" panose="020B0604020202020204" pitchFamily="34" charset="0"/>
               <a:buChar char="•"/>
             </a:pPr>
@@ -6471,7 +6460,7 @@
                 <a:cs typeface="Lato Light"/>
                 <a:sym typeface="Lato Light"/>
               </a:rPr>
-              <a:t>A </a:t>
+              <a:t>A fully </a:t>
             </a:r>
             <a:r>
               <a:rPr lang="en-US" altLang="zh-CN" sz="1600" b="1" dirty="0">
@@ -6483,21 +6472,9 @@
                 <a:cs typeface="Lato Light"/>
                 <a:sym typeface="Lato Light"/>
               </a:rPr>
-              <a:t>minimum functional app in which users can join rooms and auto-sync </a:t>
+              <a:t>functional app in which users can create/join rooms and enjoy synchronized playback.</a:t>
             </a:r>
-            <a:r>
-              <a:rPr lang="en-US" altLang="zh-CN" sz="1600" b="1" dirty="0" err="1">
-                <a:solidFill>
-                  <a:srgbClr val="666666"/>
-                </a:solidFill>
-                <a:latin typeface="Lato Light"/>
-                <a:ea typeface="Lato Light"/>
-                <a:cs typeface="Lato Light"/>
-                <a:sym typeface="Lato Light"/>
-              </a:rPr>
-              <a:t>videoes</a:t>
-            </a:r>
-            <a:endParaRPr sz="1600" b="1" dirty="0">
+            <a:endParaRPr lang="en-US" sz="1600" b="1" dirty="0">
               <a:solidFill>
                 <a:srgbClr val="666666"/>
               </a:solidFill>
@@ -7241,7 +7218,7 @@
                 </a:solidFill>
                 <a:latin typeface="Lato Light" panose="020B0604020202020204" charset="0"/>
               </a:rPr>
-              <a:t>Support Multiple DJs</a:t>
+              <a:t>Support Multiple DJs with round-robin song queue</a:t>
             </a:r>
           </a:p>
         </p:txBody>
@@ -7368,7 +7345,7 @@
                 </a:solidFill>
                 <a:latin typeface="Lato Light" panose="020B0604020202020204" charset="0"/>
               </a:rPr>
-              <a:t>Search Room by name</a:t>
+              <a:t>Allow Listeners to ‘upvote’ songs in the pool</a:t>
             </a:r>
           </a:p>
         </p:txBody>
@@ -7432,7 +7409,25 @@
                 </a:solidFill>
                 <a:latin typeface="Lato Light" panose="020B0604020202020204" charset="0"/>
               </a:rPr>
-              <a:t>Sync People list in Room</a:t>
+              <a:t>Display and </a:t>
+            </a:r>
+            <a:r>
+              <a:rPr lang="en-US" dirty="0" err="1">
+                <a:solidFill>
+                  <a:schemeClr val="bg1"/>
+                </a:solidFill>
+                <a:latin typeface="Lato Light" panose="020B0604020202020204" charset="0"/>
+              </a:rPr>
+              <a:t>async</a:t>
+            </a:r>
+            <a:r>
+              <a:rPr lang="en-US" dirty="0">
+                <a:solidFill>
+                  <a:schemeClr val="bg1"/>
+                </a:solidFill>
+                <a:latin typeface="Lato Light" panose="020B0604020202020204" charset="0"/>
+              </a:rPr>
+              <a:t> update current list of users in Room</a:t>
             </a:r>
           </a:p>
         </p:txBody>
@@ -7565,7 +7560,7 @@
             </a:br>
             <a:r>
               <a:rPr lang="en-US" sz="2800" dirty="0"/>
-              <a:t>we are Team 26,</a:t>
+              <a:t>We are Team 26,</a:t>
             </a:r>
             <a:br>
               <a:rPr lang="en-US" sz="2800" dirty="0"/>
@@ -7664,7 +7659,7 @@
                 </a:solidFill>
                 <a:latin typeface="Lato" panose="020F0502020204030203" pitchFamily="34" charset="0"/>
               </a:rPr>
-              <a:t>Create a room and invite people</a:t>
+              <a:t>Creating a room and inviting people</a:t>
             </a:r>
           </a:p>
           <a:p>
@@ -7685,7 +7680,7 @@
                 </a:solidFill>
                 <a:latin typeface="Lato" panose="020F0502020204030203" pitchFamily="34" charset="0"/>
               </a:rPr>
-              <a:t>Share Playlist as DJ or Listeners</a:t>
+              <a:t>Sharing Playlists as DJs or Listeners</a:t>
             </a:r>
           </a:p>
           <a:p>
@@ -7706,31 +7701,7 @@
                 </a:solidFill>
                 <a:latin typeface="Lato" panose="020F0502020204030203" pitchFamily="34" charset="0"/>
               </a:rPr>
-              <a:t>Sync </a:t>
-            </a:r>
-            <a:r>
-              <a:rPr lang="en-US" sz="1600" dirty="0" err="1">
-                <a:solidFill>
-                  <a:schemeClr val="tx1">
-                    <a:lumMod val="50000"/>
-                    <a:lumOff val="50000"/>
-                  </a:schemeClr>
-                </a:solidFill>
-                <a:latin typeface="Lato" panose="020F0502020204030203" pitchFamily="34" charset="0"/>
-              </a:rPr>
-              <a:t>Youtube</a:t>
-            </a:r>
-            <a:r>
-              <a:rPr lang="en-US" sz="1600" dirty="0">
-                <a:solidFill>
-                  <a:schemeClr val="tx1">
-                    <a:lumMod val="50000"/>
-                    <a:lumOff val="50000"/>
-                  </a:schemeClr>
-                </a:solidFill>
-                <a:latin typeface="Lato" panose="020F0502020204030203" pitchFamily="34" charset="0"/>
-              </a:rPr>
-              <a:t> Video in real time</a:t>
+              <a:t>Synchronizing YouTube playback in real time</a:t>
             </a:r>
           </a:p>
           <a:p>
@@ -8353,7 +8324,7 @@
               <a:buNone/>
             </a:pPr>
             <a:r>
-              <a:rPr lang="en">
+              <a:rPr lang="en-US" dirty="0">
                 <a:solidFill>
                   <a:srgbClr val="666666"/>
                 </a:solidFill>
@@ -8362,9 +8333,9 @@
                 <a:cs typeface="Lato Light"/>
                 <a:sym typeface="Lato Light"/>
               </a:rPr>
-              <a:t>last</a:t>
+              <a:t>Final Sprint</a:t>
             </a:r>
-            <a:endParaRPr>
+            <a:endParaRPr dirty="0">
               <a:solidFill>
                 <a:srgbClr val="666666"/>
               </a:solidFill>
@@ -8478,7 +8449,7 @@
                 <a:cs typeface="Lato Light"/>
                 <a:sym typeface="Lato Light"/>
               </a:rPr>
-              <a:t>A </a:t>
+              <a:t>A fully </a:t>
             </a:r>
             <a:r>
               <a:rPr lang="en-US" altLang="zh-CN" sz="1600" b="1" dirty="0">
@@ -8490,19 +8461,7 @@
                 <a:cs typeface="Lato Light"/>
                 <a:sym typeface="Lato Light"/>
               </a:rPr>
-              <a:t>minimum functional app in which users can join rooms and auto-sync </a:t>
-            </a:r>
-            <a:r>
-              <a:rPr lang="en-US" altLang="zh-CN" sz="1600" b="1" dirty="0" err="1">
-                <a:solidFill>
-                  <a:srgbClr val="666666"/>
-                </a:solidFill>
-                <a:latin typeface="Lato Light"/>
-                <a:ea typeface="Lato Light"/>
-                <a:cs typeface="Lato Light"/>
-                <a:sym typeface="Lato Light"/>
-              </a:rPr>
-              <a:t>videoes</a:t>
+              <a:t>functional app in which users can create/join rooms and enjoy synchronized playback.</a:t>
             </a:r>
             <a:endParaRPr sz="1600" b="1" dirty="0">
               <a:solidFill>
@@ -8875,25 +8834,7 @@
                 </a:solidFill>
                 <a:latin typeface="Lato Light" panose="020B0604020202020204" charset="0"/>
               </a:rPr>
-              <a:t>Search </a:t>
-            </a:r>
-            <a:r>
-              <a:rPr lang="en-US" dirty="0" err="1">
-                <a:solidFill>
-                  <a:schemeClr val="tx1"/>
-                </a:solidFill>
-                <a:latin typeface="Lato Light" panose="020B0604020202020204" charset="0"/>
-              </a:rPr>
-              <a:t>Y</a:t>
-            </a:r>
-            <a:r>
-              <a:rPr lang="en-US" altLang="zh-CN" dirty="0" err="1">
-                <a:solidFill>
-                  <a:schemeClr val="tx1"/>
-                </a:solidFill>
-                <a:latin typeface="Lato Light" panose="020B0604020202020204" charset="0"/>
-              </a:rPr>
-              <a:t>outube</a:t>
+              <a:t>Search Y</a:t>
             </a:r>
             <a:r>
               <a:rPr lang="en-US" altLang="zh-CN" dirty="0">
@@ -8902,7 +8843,7 @@
                 </a:solidFill>
                 <a:latin typeface="Lato Light" panose="020B0604020202020204" charset="0"/>
               </a:rPr>
-              <a:t> Video</a:t>
+              <a:t>ouTube Video</a:t>
             </a:r>
             <a:endParaRPr lang="en-US" dirty="0">
               <a:solidFill>
@@ -8970,7 +8911,7 @@
                 </a:solidFill>
                 <a:latin typeface="Lato Light" panose="020B0604020202020204" charset="0"/>
               </a:rPr>
-              <a:t>Add the song to DJ Queue</a:t>
+              <a:t>DJs add to Song Queue</a:t>
             </a:r>
           </a:p>
         </p:txBody>
@@ -9225,19 +9166,11 @@
           <a:p>
             <a:r>
               <a:rPr lang="en-US" dirty="0"/>
-              <a:t>Pivot from Spotify to </a:t>
-            </a:r>
-            <a:r>
-              <a:rPr lang="en-US" dirty="0" err="1"/>
-              <a:t>Y</a:t>
-            </a:r>
-            <a:r>
-              <a:rPr lang="en-US" altLang="zh-CN" dirty="0" err="1"/>
-              <a:t>outube</a:t>
+              <a:t>Pivot from Spotify to Y</a:t>
             </a:r>
             <a:r>
               <a:rPr lang="en-US" altLang="zh-CN" dirty="0"/>
-              <a:t> API</a:t>
+              <a:t>ouTube API</a:t>
             </a:r>
             <a:endParaRPr lang="en-US" dirty="0"/>
           </a:p>
@@ -9523,7 +9456,7 @@
                 </a:solidFill>
                 <a:latin typeface="Lato Light" panose="020B0604020202020204" charset="0"/>
               </a:rPr>
-              <a:t>Add the song to Listener’s Pool</a:t>
+              <a:t>Listeners add to Song Pool</a:t>
             </a:r>
           </a:p>
         </p:txBody>
@@ -9587,7 +9520,7 @@
                 </a:solidFill>
                 <a:latin typeface="Lato" panose="020F0502020204030203" pitchFamily="34" charset="0"/>
               </a:rPr>
-              <a:t>Represent all the room in the map view</a:t>
+              <a:t>Represent all the rooms in the map view</a:t>
             </a:r>
           </a:p>
         </p:txBody>
@@ -9779,13 +9712,22 @@
           <a:p>
             <a:pPr algn="ctr"/>
             <a:r>
-              <a:rPr lang="en-US" dirty="0">
+              <a:rPr lang="en-US" dirty="0" err="1">
                 <a:solidFill>
                   <a:schemeClr val="tx1"/>
                 </a:solidFill>
                 <a:latin typeface="Lato Light" panose="020B0604020202020204" charset="0"/>
               </a:rPr>
-              <a:t>Play videos from DJ queue</a:t>
+              <a:t>Autoplay</a:t>
+            </a:r>
+            <a:r>
+              <a:rPr lang="en-US" dirty="0">
+                <a:solidFill>
+                  <a:schemeClr val="tx1"/>
+                </a:solidFill>
+                <a:latin typeface="Lato Light" panose="020B0604020202020204" charset="0"/>
+              </a:rPr>
+              <a:t> videos from Song queue</a:t>
             </a:r>
           </a:p>
         </p:txBody>
@@ -10969,25 +10911,7 @@
                 </a:solidFill>
                 <a:latin typeface="Lato Light" panose="020B0604020202020204" charset="0"/>
               </a:rPr>
-              <a:t>Search </a:t>
-            </a:r>
-            <a:r>
-              <a:rPr lang="en-US" dirty="0" err="1">
-                <a:solidFill>
-                  <a:schemeClr val="tx1"/>
-                </a:solidFill>
-                <a:latin typeface="Lato Light" panose="020B0604020202020204" charset="0"/>
-              </a:rPr>
-              <a:t>Y</a:t>
-            </a:r>
-            <a:r>
-              <a:rPr lang="en-US" altLang="zh-CN" dirty="0" err="1">
-                <a:solidFill>
-                  <a:schemeClr val="tx1"/>
-                </a:solidFill>
-                <a:latin typeface="Lato Light" panose="020B0604020202020204" charset="0"/>
-              </a:rPr>
-              <a:t>outube</a:t>
+              <a:t>Search Y</a:t>
             </a:r>
             <a:r>
               <a:rPr lang="en-US" altLang="zh-CN" dirty="0">
@@ -10996,7 +10920,7 @@
                 </a:solidFill>
                 <a:latin typeface="Lato Light" panose="020B0604020202020204" charset="0"/>
               </a:rPr>
-              <a:t> Video</a:t>
+              <a:t>ouTube Video</a:t>
             </a:r>
             <a:endParaRPr lang="en-US" dirty="0">
               <a:solidFill>
@@ -11064,7 +10988,7 @@
                 </a:solidFill>
                 <a:latin typeface="Lato Light" panose="020B0604020202020204" charset="0"/>
               </a:rPr>
-              <a:t>Add the song to DJ Queue</a:t>
+              <a:t>DJs add to Song Queue</a:t>
             </a:r>
           </a:p>
         </p:txBody>
@@ -11447,7 +11371,7 @@
                 </a:solidFill>
                 <a:latin typeface="Lato Light" panose="020B0604020202020204" charset="0"/>
               </a:rPr>
-              <a:t>Add the song to Listener’s Pool</a:t>
+              <a:t>Listeners add to Song Pool</a:t>
             </a:r>
           </a:p>
         </p:txBody>
@@ -11511,7 +11435,7 @@
                 </a:solidFill>
                 <a:latin typeface="Lato" panose="020F0502020204030203" pitchFamily="34" charset="0"/>
               </a:rPr>
-              <a:t>Represent all the room in the map view</a:t>
+              <a:t>Represent all the rooms in the map view</a:t>
             </a:r>
           </a:p>
         </p:txBody>
@@ -11703,13 +11627,22 @@
           <a:p>
             <a:pPr algn="ctr"/>
             <a:r>
-              <a:rPr lang="en-US" dirty="0">
+              <a:rPr lang="en-US" dirty="0" err="1">
                 <a:solidFill>
                   <a:schemeClr val="tx1"/>
                 </a:solidFill>
                 <a:latin typeface="Lato Light" panose="020B0604020202020204" charset="0"/>
               </a:rPr>
-              <a:t>Play videos from DJ queue</a:t>
+              <a:t>Autoplay</a:t>
+            </a:r>
+            <a:r>
+              <a:rPr lang="en-US" dirty="0">
+                <a:solidFill>
+                  <a:schemeClr val="tx1"/>
+                </a:solidFill>
+                <a:latin typeface="Lato Light" panose="020B0604020202020204" charset="0"/>
+              </a:rPr>
+              <a:t> videos from Song queue</a:t>
             </a:r>
           </a:p>
         </p:txBody>
@@ -11899,7 +11832,7 @@
         <p:spPr>
           <a:xfrm>
             <a:off x="3451412" y="2071202"/>
-            <a:ext cx="3899647" cy="797247"/>
+            <a:ext cx="4153934" cy="797247"/>
           </a:xfrm>
         </p:spPr>
         <p:txBody>
@@ -11911,25 +11844,25 @@
             </a:pPr>
             <a:r>
               <a:rPr lang="en-US" sz="2000" b="1" dirty="0"/>
-              <a:t>Better solutions: Django Socket</a:t>
+              <a:t>Better solutions: Django Sockets</a:t>
             </a:r>
           </a:p>
           <a:p>
             <a:r>
               <a:rPr lang="en-US" sz="1800" dirty="0"/>
-              <a:t> - Join the channel whenever you join the room</a:t>
+              <a:t> Join the Django channel whenever you join the room</a:t>
             </a:r>
           </a:p>
           <a:p>
             <a:r>
               <a:rPr lang="en-US" sz="1800" dirty="0"/>
-              <a:t>        - 'Host' broadcasts any player state change</a:t>
+              <a:t>'Host' broadcasts any player state changes</a:t>
             </a:r>
           </a:p>
           <a:p>
             <a:r>
               <a:rPr lang="en-US" sz="1800" dirty="0"/>
-              <a:t>        - 'Listeners' receive player state change and adjust their playback</a:t>
+              <a:t>'Listeners' receive player state change and adjust their playback</a:t>
             </a:r>
           </a:p>
         </p:txBody>
@@ -12359,15 +12292,7 @@
           <a:p>
             <a:r>
               <a:rPr lang="en-US" sz="1800" dirty="0"/>
-              <a:t> Search and add </a:t>
-            </a:r>
-            <a:r>
-              <a:rPr lang="en-US" sz="1800" dirty="0" err="1"/>
-              <a:t>Youtube</a:t>
-            </a:r>
-            <a:r>
-              <a:rPr lang="en-US" sz="1800" dirty="0"/>
-              <a:t> Video without refreshing the page</a:t>
+              <a:t> Search and add YouTube Videos without refreshing the page</a:t>
             </a:r>
           </a:p>
         </p:txBody>
@@ -12409,23 +12334,7 @@
           <a:p>
             <a:r>
               <a:rPr lang="en-US" sz="1800" dirty="0"/>
-              <a:t>Everything in AJAX! so it won't break the user </a:t>
-            </a:r>
-            <a:r>
-              <a:rPr lang="en-US" sz="1800" dirty="0" err="1"/>
-              <a:t>experiance</a:t>
-            </a:r>
-            <a:r>
-              <a:rPr lang="en-US" sz="1800" dirty="0"/>
-              <a:t> with the </a:t>
-            </a:r>
-            <a:r>
-              <a:rPr lang="en-US" sz="1800" dirty="0" err="1"/>
-              <a:t>django</a:t>
-            </a:r>
-            <a:r>
-              <a:rPr lang="en-US" sz="1800" dirty="0"/>
-              <a:t> channel</a:t>
+              <a:t>Everything in AJAX! So it won’t force user to refresh the page and stop playback.</a:t>
             </a:r>
           </a:p>
         </p:txBody>

</xml_diff>

<commit_message>
After rehearsing, more updates
</commit_message>
<xml_diff>
--- a/sprint-presentations/1119_WebApp_presentation.pptx
+++ b/sprint-presentations/1119_WebApp_presentation.pptx
@@ -5,7 +5,7 @@
     <p:sldMasterId id="2147483659" r:id="rId1"/>
   </p:sldMasterIdLst>
   <p:notesMasterIdLst>
-    <p:notesMasterId r:id="rId16"/>
+    <p:notesMasterId r:id="rId15"/>
   </p:notesMasterIdLst>
   <p:sldIdLst>
     <p:sldId id="256" r:id="rId2"/>
@@ -18,31 +18,30 @@
     <p:sldId id="287" r:id="rId9"/>
     <p:sldId id="290" r:id="rId10"/>
     <p:sldId id="284" r:id="rId11"/>
-    <p:sldId id="259" r:id="rId12"/>
-    <p:sldId id="285" r:id="rId13"/>
-    <p:sldId id="289" r:id="rId14"/>
-    <p:sldId id="279" r:id="rId15"/>
+    <p:sldId id="285" r:id="rId12"/>
+    <p:sldId id="289" r:id="rId13"/>
+    <p:sldId id="279" r:id="rId14"/>
   </p:sldIdLst>
   <p:sldSz cx="9144000" cy="5143500" type="screen16x9"/>
   <p:notesSz cx="6858000" cy="9144000"/>
   <p:embeddedFontLst>
     <p:embeddedFont>
-      <p:font typeface="Lato" panose="020F0502020204030203" pitchFamily="34" charset="77"/>
-      <p:regular r:id="rId17"/>
+      <p:font typeface="Lato Hairline" panose="020F0502020204030203" pitchFamily="34" charset="77"/>
+      <p:regular r:id="rId16"/>
+      <p:bold r:id="rId17"/>
+      <p:italic r:id="rId18"/>
+      <p:boldItalic r:id="rId19"/>
     </p:embeddedFont>
     <p:embeddedFont>
       <p:font typeface="Lato Light" panose="020F0502020204030203" pitchFamily="34" charset="77"/>
-      <p:regular r:id="rId18"/>
-      <p:bold r:id="rId19"/>
-      <p:italic r:id="rId20"/>
-      <p:boldItalic r:id="rId21"/>
+      <p:regular r:id="rId20"/>
+      <p:bold r:id="rId21"/>
+      <p:italic r:id="rId22"/>
+      <p:boldItalic r:id="rId23"/>
     </p:embeddedFont>
     <p:embeddedFont>
-      <p:font typeface="Lato Hairline" panose="020F0502020204030203" pitchFamily="34" charset="77"/>
-      <p:regular r:id="rId22"/>
-      <p:bold r:id="rId23"/>
-      <p:italic r:id="rId24"/>
-      <p:boldItalic r:id="rId25"/>
+      <p:font typeface="Lato" panose="020F0502020204030203" pitchFamily="34" charset="77"/>
+      <p:regular r:id="rId24"/>
     </p:embeddedFont>
   </p:embeddedFontLst>
   <p:defaultTextStyle>
@@ -813,6 +812,10 @@
               </a:spcAft>
               <a:buNone/>
             </a:pPr>
+            <a:r>
+              <a:rPr lang="en-US" dirty="0"/>
+              <a:t>Rui</a:t>
+            </a:r>
             <a:endParaRPr dirty="0"/>
           </a:p>
         </p:txBody>
@@ -830,7 +833,7 @@
   <p:cSld>
     <p:spTree>
       <p:nvGrpSpPr>
-        <p:cNvPr id="1" name="Shape 246"/>
+        <p:cNvPr id="1" name="Shape 186"/>
         <p:cNvGrpSpPr/>
         <p:nvPr/>
       </p:nvGrpSpPr>
@@ -844,7 +847,7 @@
       </p:grpSpPr>
       <p:sp>
         <p:nvSpPr>
-          <p:cNvPr id="247" name="Google Shape;247;g35ed75ccf_022:notes"/>
+          <p:cNvPr id="187" name="Google Shape;187;g35ed75ccf_044:notes"/>
           <p:cNvSpPr>
             <a:spLocks noGrp="1" noRot="1" noChangeAspect="1"/>
           </p:cNvSpPr>
@@ -885,7 +888,7 @@
       </p:sp>
       <p:sp>
         <p:nvSpPr>
-          <p:cNvPr id="248" name="Google Shape;248;g35ed75ccf_022:notes"/>
+          <p:cNvPr id="188" name="Google Shape;188;g35ed75ccf_044:notes"/>
           <p:cNvSpPr txBox="1">
             <a:spLocks noGrp="1"/>
           </p:cNvSpPr>
@@ -917,11 +920,20 @@
               </a:spcAft>
               <a:buNone/>
             </a:pPr>
-            <a:endParaRPr/>
+            <a:r>
+              <a:rPr lang="en-US" dirty="0"/>
+              <a:t>Noam</a:t>
+            </a:r>
+            <a:endParaRPr dirty="0"/>
           </a:p>
         </p:txBody>
       </p:sp>
     </p:spTree>
+    <p:extLst>
+      <p:ext uri="{BB962C8B-B14F-4D97-AF65-F5344CB8AC3E}">
+        <p14:creationId xmlns:p14="http://schemas.microsoft.com/office/powerpoint/2010/main" val="3415559119"/>
+      </p:ext>
+    </p:extLst>
   </p:cSld>
   <p:clrMapOvr>
     <a:masterClrMapping/>
@@ -929,12 +941,12 @@
 </p:notes>
 </file>
 
-<file path=ppt/notesSlides/notesSlide2.xml><?xml version="1.0" encoding="utf-8"?>
-<p:notes xmlns:a="http://schemas.openxmlformats.org/drawingml/2006/main" xmlns:r="http://schemas.openxmlformats.org/officeDocument/2006/relationships" xmlns:p="http://schemas.openxmlformats.org/presentationml/2006/main" showMasterSp="0" showMasterPhAnim="0">
+<file path=ppt/notesSlides/notesSlide11.xml><?xml version="1.0" encoding="utf-8"?>
+<p:notes xmlns:a="http://schemas.openxmlformats.org/drawingml/2006/main" xmlns:r="http://schemas.openxmlformats.org/officeDocument/2006/relationships" xmlns:p="http://schemas.openxmlformats.org/presentationml/2006/main">
   <p:cSld>
     <p:spTree>
       <p:nvGrpSpPr>
-        <p:cNvPr id="1" name="Shape 138"/>
+        <p:cNvPr id="1" name=""/>
         <p:cNvGrpSpPr/>
         <p:nvPr/>
       </p:nvGrpSpPr>
@@ -948,7 +960,151 @@
       </p:grpSpPr>
       <p:sp>
         <p:nvSpPr>
-          <p:cNvPr id="139" name="Google Shape;139;g35f391192_073:notes"/>
+          <p:cNvPr id="2" name="Slide Image Placeholder 1"/>
+          <p:cNvSpPr>
+            <a:spLocks noGrp="1" noRot="1" noChangeAspect="1"/>
+          </p:cNvSpPr>
+          <p:nvPr>
+            <p:ph type="sldImg"/>
+          </p:nvPr>
+        </p:nvSpPr>
+        <p:spPr>
+          <a:xfrm>
+            <a:off x="381000" y="685800"/>
+            <a:ext cx="6096000" cy="3429000"/>
+          </a:xfrm>
+        </p:spPr>
+      </p:sp>
+      <p:sp>
+        <p:nvSpPr>
+          <p:cNvPr id="3" name="Notes Placeholder 2"/>
+          <p:cNvSpPr>
+            <a:spLocks noGrp="1"/>
+          </p:cNvSpPr>
+          <p:nvPr>
+            <p:ph type="body" idx="1"/>
+          </p:nvPr>
+        </p:nvSpPr>
+        <p:spPr/>
+        <p:txBody>
+          <a:bodyPr/>
+          <a:lstStyle/>
+          <a:p>
+            <a:pPr marL="139700" indent="0">
+              <a:buNone/>
+            </a:pPr>
+            <a:r>
+              <a:rPr lang="en-US" dirty="0"/>
+              <a:t>Noam</a:t>
+            </a:r>
+          </a:p>
+        </p:txBody>
+      </p:sp>
+    </p:spTree>
+    <p:extLst>
+      <p:ext uri="{BB962C8B-B14F-4D97-AF65-F5344CB8AC3E}">
+        <p14:creationId xmlns:p14="http://schemas.microsoft.com/office/powerpoint/2010/main" val="3688710859"/>
+      </p:ext>
+    </p:extLst>
+  </p:cSld>
+  <p:clrMapOvr>
+    <a:masterClrMapping/>
+  </p:clrMapOvr>
+</p:notes>
+</file>
+
+<file path=ppt/notesSlides/notesSlide12.xml><?xml version="1.0" encoding="utf-8"?>
+<p:notes xmlns:a="http://schemas.openxmlformats.org/drawingml/2006/main" xmlns:r="http://schemas.openxmlformats.org/officeDocument/2006/relationships" xmlns:p="http://schemas.openxmlformats.org/presentationml/2006/main">
+  <p:cSld>
+    <p:spTree>
+      <p:nvGrpSpPr>
+        <p:cNvPr id="1" name=""/>
+        <p:cNvGrpSpPr/>
+        <p:nvPr/>
+      </p:nvGrpSpPr>
+      <p:grpSpPr>
+        <a:xfrm>
+          <a:off x="0" y="0"/>
+          <a:ext cx="0" cy="0"/>
+          <a:chOff x="0" y="0"/>
+          <a:chExt cx="0" cy="0"/>
+        </a:xfrm>
+      </p:grpSpPr>
+      <p:sp>
+        <p:nvSpPr>
+          <p:cNvPr id="2" name="Slide Image Placeholder 1"/>
+          <p:cNvSpPr>
+            <a:spLocks noGrp="1" noRot="1" noChangeAspect="1"/>
+          </p:cNvSpPr>
+          <p:nvPr>
+            <p:ph type="sldImg"/>
+          </p:nvPr>
+        </p:nvSpPr>
+        <p:spPr>
+          <a:xfrm>
+            <a:off x="381000" y="685800"/>
+            <a:ext cx="6096000" cy="3429000"/>
+          </a:xfrm>
+        </p:spPr>
+      </p:sp>
+      <p:sp>
+        <p:nvSpPr>
+          <p:cNvPr id="3" name="Notes Placeholder 2"/>
+          <p:cNvSpPr>
+            <a:spLocks noGrp="1"/>
+          </p:cNvSpPr>
+          <p:nvPr>
+            <p:ph type="body" idx="1"/>
+          </p:nvPr>
+        </p:nvSpPr>
+        <p:spPr/>
+        <p:txBody>
+          <a:bodyPr/>
+          <a:lstStyle/>
+          <a:p>
+            <a:pPr marL="139700" indent="0">
+              <a:buNone/>
+            </a:pPr>
+            <a:r>
+              <a:rPr lang="en-US" dirty="0"/>
+              <a:t>Rui</a:t>
+            </a:r>
+          </a:p>
+        </p:txBody>
+      </p:sp>
+    </p:spTree>
+    <p:extLst>
+      <p:ext uri="{BB962C8B-B14F-4D97-AF65-F5344CB8AC3E}">
+        <p14:creationId xmlns:p14="http://schemas.microsoft.com/office/powerpoint/2010/main" val="365226967"/>
+      </p:ext>
+    </p:extLst>
+  </p:cSld>
+  <p:clrMapOvr>
+    <a:masterClrMapping/>
+  </p:clrMapOvr>
+</p:notes>
+</file>
+
+<file path=ppt/notesSlides/notesSlide13.xml><?xml version="1.0" encoding="utf-8"?>
+<p:notes xmlns:a="http://schemas.openxmlformats.org/drawingml/2006/main" xmlns:r="http://schemas.openxmlformats.org/officeDocument/2006/relationships" xmlns:p="http://schemas.openxmlformats.org/presentationml/2006/main" showMasterSp="0" showMasterPhAnim="0">
+  <p:cSld>
+    <p:spTree>
+      <p:nvGrpSpPr>
+        <p:cNvPr id="1" name="Shape 246"/>
+        <p:cNvGrpSpPr/>
+        <p:nvPr/>
+      </p:nvGrpSpPr>
+      <p:grpSpPr>
+        <a:xfrm>
+          <a:off x="0" y="0"/>
+          <a:ext cx="0" cy="0"/>
+          <a:chOff x="0" y="0"/>
+          <a:chExt cx="0" cy="0"/>
+        </a:xfrm>
+      </p:grpSpPr>
+      <p:sp>
+        <p:nvSpPr>
+          <p:cNvPr id="247" name="Google Shape;247;g35ed75ccf_022:notes"/>
           <p:cNvSpPr>
             <a:spLocks noGrp="1" noRot="1" noChangeAspect="1"/>
           </p:cNvSpPr>
@@ -989,7 +1145,7 @@
       </p:sp>
       <p:sp>
         <p:nvSpPr>
-          <p:cNvPr id="140" name="Google Shape;140;g35f391192_073:notes"/>
+          <p:cNvPr id="248" name="Google Shape;248;g35ed75ccf_022:notes"/>
           <p:cNvSpPr txBox="1">
             <a:spLocks noGrp="1"/>
           </p:cNvSpPr>
@@ -1021,7 +1177,11 @@
               </a:spcAft>
               <a:buNone/>
             </a:pPr>
-            <a:endParaRPr/>
+            <a:r>
+              <a:rPr lang="en-US" dirty="0"/>
+              <a:t>Rui</a:t>
+            </a:r>
+            <a:endParaRPr dirty="0"/>
           </a:p>
         </p:txBody>
       </p:sp>
@@ -1033,12 +1193,12 @@
 </p:notes>
 </file>
 
-<file path=ppt/notesSlides/notesSlide3.xml><?xml version="1.0" encoding="utf-8"?>
+<file path=ppt/notesSlides/notesSlide2.xml><?xml version="1.0" encoding="utf-8"?>
 <p:notes xmlns:a="http://schemas.openxmlformats.org/drawingml/2006/main" xmlns:r="http://schemas.openxmlformats.org/officeDocument/2006/relationships" xmlns:p="http://schemas.openxmlformats.org/presentationml/2006/main" showMasterSp="0" showMasterPhAnim="0">
   <p:cSld>
     <p:spTree>
       <p:nvGrpSpPr>
-        <p:cNvPr id="1" name="Shape 186"/>
+        <p:cNvPr id="1" name="Shape 138"/>
         <p:cNvGrpSpPr/>
         <p:nvPr/>
       </p:nvGrpSpPr>
@@ -1052,7 +1212,7 @@
       </p:grpSpPr>
       <p:sp>
         <p:nvSpPr>
-          <p:cNvPr id="187" name="Google Shape;187;g35ed75ccf_044:notes"/>
+          <p:cNvPr id="139" name="Google Shape;139;g35f391192_073:notes"/>
           <p:cNvSpPr>
             <a:spLocks noGrp="1" noRot="1" noChangeAspect="1"/>
           </p:cNvSpPr>
@@ -1093,7 +1253,7 @@
       </p:sp>
       <p:sp>
         <p:nvSpPr>
-          <p:cNvPr id="188" name="Google Shape;188;g35ed75ccf_044:notes"/>
+          <p:cNvPr id="140" name="Google Shape;140;g35f391192_073:notes"/>
           <p:cNvSpPr txBox="1">
             <a:spLocks noGrp="1"/>
           </p:cNvSpPr>
@@ -1125,6 +1285,10 @@
               </a:spcAft>
               <a:buNone/>
             </a:pPr>
+            <a:r>
+              <a:rPr lang="en-US" dirty="0"/>
+              <a:t>Rui</a:t>
+            </a:r>
             <a:endParaRPr dirty="0"/>
           </a:p>
         </p:txBody>
@@ -1137,12 +1301,12 @@
 </p:notes>
 </file>
 
-<file path=ppt/notesSlides/notesSlide4.xml><?xml version="1.0" encoding="utf-8"?>
+<file path=ppt/notesSlides/notesSlide3.xml><?xml version="1.0" encoding="utf-8"?>
 <p:notes xmlns:a="http://schemas.openxmlformats.org/drawingml/2006/main" xmlns:r="http://schemas.openxmlformats.org/officeDocument/2006/relationships" xmlns:p="http://schemas.openxmlformats.org/presentationml/2006/main" showMasterSp="0" showMasterPhAnim="0">
   <p:cSld>
     <p:spTree>
       <p:nvGrpSpPr>
-        <p:cNvPr id="1" name="Shape 61"/>
+        <p:cNvPr id="1" name="Shape 186"/>
         <p:cNvGrpSpPr/>
         <p:nvPr/>
       </p:nvGrpSpPr>
@@ -1156,7 +1320,7 @@
       </p:grpSpPr>
       <p:sp>
         <p:nvSpPr>
-          <p:cNvPr id="62" name="Google Shape;62;g3606f1c2d_30:notes"/>
+          <p:cNvPr id="187" name="Google Shape;187;g35ed75ccf_044:notes"/>
           <p:cNvSpPr>
             <a:spLocks noGrp="1" noRot="1" noChangeAspect="1"/>
           </p:cNvSpPr>
@@ -1197,7 +1361,7 @@
       </p:sp>
       <p:sp>
         <p:nvSpPr>
-          <p:cNvPr id="63" name="Google Shape;63;g3606f1c2d_30:notes"/>
+          <p:cNvPr id="188" name="Google Shape;188;g35ed75ccf_044:notes"/>
           <p:cNvSpPr txBox="1">
             <a:spLocks noGrp="1"/>
           </p:cNvSpPr>
@@ -1229,11 +1393,172 @@
               </a:spcAft>
               <a:buNone/>
             </a:pPr>
+            <a:r>
+              <a:rPr lang="en-US" dirty="0"/>
+              <a:t>Rui</a:t>
+            </a:r>
             <a:endParaRPr dirty="0"/>
           </a:p>
         </p:txBody>
       </p:sp>
     </p:spTree>
+  </p:cSld>
+  <p:clrMapOvr>
+    <a:masterClrMapping/>
+  </p:clrMapOvr>
+</p:notes>
+</file>
+
+<file path=ppt/notesSlides/notesSlide4.xml><?xml version="1.0" encoding="utf-8"?>
+<p:notes xmlns:a="http://schemas.openxmlformats.org/drawingml/2006/main" xmlns:r="http://schemas.openxmlformats.org/officeDocument/2006/relationships" xmlns:p="http://schemas.openxmlformats.org/presentationml/2006/main">
+  <p:cSld>
+    <p:spTree>
+      <p:nvGrpSpPr>
+        <p:cNvPr id="1" name=""/>
+        <p:cNvGrpSpPr/>
+        <p:nvPr/>
+      </p:nvGrpSpPr>
+      <p:grpSpPr>
+        <a:xfrm>
+          <a:off x="0" y="0"/>
+          <a:ext cx="0" cy="0"/>
+          <a:chOff x="0" y="0"/>
+          <a:chExt cx="0" cy="0"/>
+        </a:xfrm>
+      </p:grpSpPr>
+      <p:sp>
+        <p:nvSpPr>
+          <p:cNvPr id="2" name="Slide Image Placeholder 1"/>
+          <p:cNvSpPr>
+            <a:spLocks noGrp="1" noRot="1" noChangeAspect="1"/>
+          </p:cNvSpPr>
+          <p:nvPr>
+            <p:ph type="sldImg"/>
+          </p:nvPr>
+        </p:nvSpPr>
+        <p:spPr>
+          <a:xfrm>
+            <a:off x="381000" y="685800"/>
+            <a:ext cx="6096000" cy="3429000"/>
+          </a:xfrm>
+        </p:spPr>
+      </p:sp>
+      <p:sp>
+        <p:nvSpPr>
+          <p:cNvPr id="3" name="Notes Placeholder 2"/>
+          <p:cNvSpPr>
+            <a:spLocks noGrp="1"/>
+          </p:cNvSpPr>
+          <p:nvPr>
+            <p:ph type="body" idx="1"/>
+          </p:nvPr>
+        </p:nvSpPr>
+        <p:spPr/>
+        <p:txBody>
+          <a:bodyPr/>
+          <a:lstStyle/>
+          <a:p>
+            <a:r>
+              <a:rPr lang="en-US" dirty="0"/>
+              <a:t>Start with user registration, email, login (Rui)</a:t>
+            </a:r>
+          </a:p>
+          <a:p>
+            <a:r>
+              <a:rPr lang="en-US" dirty="0"/>
+              <a:t>Room tour (Rui)</a:t>
+            </a:r>
+          </a:p>
+          <a:p>
+            <a:pPr lvl="1"/>
+            <a:r>
+              <a:rPr lang="en-US" dirty="0"/>
+              <a:t>Create a room</a:t>
+            </a:r>
+          </a:p>
+          <a:p>
+            <a:pPr lvl="1"/>
+            <a:r>
+              <a:rPr lang="en-US" dirty="0"/>
+              <a:t>Enter the room</a:t>
+            </a:r>
+          </a:p>
+          <a:p>
+            <a:pPr lvl="1"/>
+            <a:r>
+              <a:rPr lang="en-US" dirty="0"/>
+              <a:t>Add songs</a:t>
+            </a:r>
+          </a:p>
+          <a:p>
+            <a:r>
+              <a:rPr lang="en-US" dirty="0"/>
+              <a:t>Maps tour (Noam)</a:t>
+            </a:r>
+          </a:p>
+          <a:p>
+            <a:pPr lvl="1"/>
+            <a:r>
+              <a:rPr lang="en-US" dirty="0"/>
+              <a:t>Show randomly placed locations (for demo purposes)</a:t>
+            </a:r>
+          </a:p>
+          <a:p>
+            <a:pPr lvl="1"/>
+            <a:r>
+              <a:rPr lang="en-US" dirty="0"/>
+              <a:t>Allow user location in browser</a:t>
+            </a:r>
+          </a:p>
+          <a:p>
+            <a:pPr lvl="1"/>
+            <a:r>
+              <a:rPr lang="en-US" dirty="0"/>
+              <a:t>Can enter a room at a specific location</a:t>
+            </a:r>
+          </a:p>
+          <a:p>
+            <a:r>
+              <a:rPr lang="en-US" dirty="0"/>
+              <a:t>Show sync. Playback</a:t>
+            </a:r>
+          </a:p>
+          <a:p>
+            <a:pPr lvl="1"/>
+            <a:r>
+              <a:rPr lang="en-US" dirty="0"/>
+              <a:t>Enter a room with Host</a:t>
+            </a:r>
+          </a:p>
+          <a:p>
+            <a:pPr lvl="1"/>
+            <a:r>
+              <a:rPr lang="en-US" dirty="0"/>
+              <a:t>Enter a room with Listener(s)</a:t>
+            </a:r>
+          </a:p>
+          <a:p>
+            <a:pPr lvl="1"/>
+            <a:r>
+              <a:rPr lang="en-US" dirty="0"/>
+              <a:t>Pause/play/next with Host</a:t>
+            </a:r>
+          </a:p>
+          <a:p>
+            <a:pPr lvl="1"/>
+            <a:r>
+              <a:rPr lang="en-US" dirty="0"/>
+              <a:t>Listener can join room later, will sync-up on start</a:t>
+            </a:r>
+          </a:p>
+        </p:txBody>
+      </p:sp>
+    </p:spTree>
+    <p:extLst>
+      <p:ext uri="{BB962C8B-B14F-4D97-AF65-F5344CB8AC3E}">
+        <p14:creationId xmlns:p14="http://schemas.microsoft.com/office/powerpoint/2010/main" val="4016927181"/>
+      </p:ext>
+    </p:extLst>
   </p:cSld>
   <p:clrMapOvr>
     <a:masterClrMapping/>
@@ -1246,7 +1571,7 @@
   <p:cSld>
     <p:spTree>
       <p:nvGrpSpPr>
-        <p:cNvPr id="1" name="Shape 116"/>
+        <p:cNvPr id="1" name="Shape 61"/>
         <p:cNvGrpSpPr/>
         <p:nvPr/>
       </p:nvGrpSpPr>
@@ -1260,7 +1585,7 @@
       </p:grpSpPr>
       <p:sp>
         <p:nvSpPr>
-          <p:cNvPr id="117" name="Google Shape;117;g35f391192_045:notes"/>
+          <p:cNvPr id="62" name="Google Shape;62;g3606f1c2d_30:notes"/>
           <p:cNvSpPr>
             <a:spLocks noGrp="1" noRot="1" noChangeAspect="1"/>
           </p:cNvSpPr>
@@ -1301,7 +1626,7 @@
       </p:sp>
       <p:sp>
         <p:nvSpPr>
-          <p:cNvPr id="118" name="Google Shape;118;g35f391192_045:notes"/>
+          <p:cNvPr id="63" name="Google Shape;63;g3606f1c2d_30:notes"/>
           <p:cNvSpPr txBox="1">
             <a:spLocks noGrp="1"/>
           </p:cNvSpPr>
@@ -1333,6 +1658,10 @@
               </a:spcAft>
               <a:buNone/>
             </a:pPr>
+            <a:r>
+              <a:rPr lang="en-US" dirty="0"/>
+              <a:t>Sam</a:t>
+            </a:r>
             <a:endParaRPr dirty="0"/>
           </a:p>
         </p:txBody>
@@ -1346,11 +1675,11 @@
 </file>
 
 <file path=ppt/notesSlides/notesSlide6.xml><?xml version="1.0" encoding="utf-8"?>
-<p:notes xmlns:a="http://schemas.openxmlformats.org/drawingml/2006/main" xmlns:r="http://schemas.openxmlformats.org/officeDocument/2006/relationships" xmlns:p="http://schemas.openxmlformats.org/presentationml/2006/main">
+<p:notes xmlns:a="http://schemas.openxmlformats.org/drawingml/2006/main" xmlns:r="http://schemas.openxmlformats.org/officeDocument/2006/relationships" xmlns:p="http://schemas.openxmlformats.org/presentationml/2006/main" showMasterSp="0" showMasterPhAnim="0">
   <p:cSld>
     <p:spTree>
       <p:nvGrpSpPr>
-        <p:cNvPr id="1" name=""/>
+        <p:cNvPr id="1" name="Shape 116"/>
         <p:cNvGrpSpPr/>
         <p:nvPr/>
       </p:nvGrpSpPr>
@@ -1364,171 +1693,7 @@
       </p:grpSpPr>
       <p:sp>
         <p:nvSpPr>
-          <p:cNvPr id="2" name="幻灯片图像占位符 1"/>
-          <p:cNvSpPr>
-            <a:spLocks noGrp="1" noRot="1" noChangeAspect="1"/>
-          </p:cNvSpPr>
-          <p:nvPr>
-            <p:ph type="sldImg"/>
-          </p:nvPr>
-        </p:nvSpPr>
-        <p:spPr>
-          <a:xfrm>
-            <a:off x="381000" y="685800"/>
-            <a:ext cx="6096000" cy="3429000"/>
-          </a:xfrm>
-        </p:spPr>
-      </p:sp>
-      <p:sp>
-        <p:nvSpPr>
-          <p:cNvPr id="3" name="备注占位符 2"/>
-          <p:cNvSpPr>
-            <a:spLocks noGrp="1"/>
-          </p:cNvSpPr>
-          <p:nvPr>
-            <p:ph type="body" idx="1"/>
-          </p:nvPr>
-        </p:nvSpPr>
-        <p:spPr/>
-        <p:txBody>
-          <a:bodyPr/>
-          <a:lstStyle/>
-          <a:p>
-            <a:r>
-              <a:rPr lang="en-US" dirty="0" err="1"/>
-              <a:t>Spotipy</a:t>
-            </a:r>
-            <a:r>
-              <a:rPr lang="en-US" dirty="0"/>
-              <a:t> (the Python wrapper we relied on) does not refresh tokens automatically</a:t>
-            </a:r>
-          </a:p>
-          <a:p>
-            <a:r>
-              <a:rPr lang="en-US" dirty="0"/>
-              <a:t>Web Playback SDK is in ‘Beta’ and not fully functional. Also a crucial endpoint in the Spotify Web API seems to have an unresolved bug (opened this past June on GitHub).</a:t>
-            </a:r>
-          </a:p>
-          <a:p>
-            <a:endParaRPr lang="en-US" dirty="0"/>
-          </a:p>
-        </p:txBody>
-      </p:sp>
-    </p:spTree>
-    <p:extLst>
-      <p:ext uri="{BB962C8B-B14F-4D97-AF65-F5344CB8AC3E}">
-        <p14:creationId xmlns:p14="http://schemas.microsoft.com/office/powerpoint/2010/main" val="4174261551"/>
-      </p:ext>
-    </p:extLst>
-  </p:cSld>
-  <p:clrMapOvr>
-    <a:masterClrMapping/>
-  </p:clrMapOvr>
-</p:notes>
-</file>
-
-<file path=ppt/notesSlides/notesSlide7.xml><?xml version="1.0" encoding="utf-8"?>
-<p:notes xmlns:a="http://schemas.openxmlformats.org/drawingml/2006/main" xmlns:r="http://schemas.openxmlformats.org/officeDocument/2006/relationships" xmlns:p="http://schemas.openxmlformats.org/presentationml/2006/main">
-  <p:cSld>
-    <p:spTree>
-      <p:nvGrpSpPr>
-        <p:cNvPr id="1" name=""/>
-        <p:cNvGrpSpPr/>
-        <p:nvPr/>
-      </p:nvGrpSpPr>
-      <p:grpSpPr>
-        <a:xfrm>
-          <a:off x="0" y="0"/>
-          <a:ext cx="0" cy="0"/>
-          <a:chOff x="0" y="0"/>
-          <a:chExt cx="0" cy="0"/>
-        </a:xfrm>
-      </p:grpSpPr>
-      <p:sp>
-        <p:nvSpPr>
-          <p:cNvPr id="2" name="幻灯片图像占位符 1"/>
-          <p:cNvSpPr>
-            <a:spLocks noGrp="1" noRot="1" noChangeAspect="1"/>
-          </p:cNvSpPr>
-          <p:nvPr>
-            <p:ph type="sldImg"/>
-          </p:nvPr>
-        </p:nvSpPr>
-        <p:spPr>
-          <a:xfrm>
-            <a:off x="381000" y="685800"/>
-            <a:ext cx="6096000" cy="3429000"/>
-          </a:xfrm>
-        </p:spPr>
-      </p:sp>
-      <p:sp>
-        <p:nvSpPr>
-          <p:cNvPr id="3" name="备注占位符 2"/>
-          <p:cNvSpPr>
-            <a:spLocks noGrp="1"/>
-          </p:cNvSpPr>
-          <p:nvPr>
-            <p:ph type="body" idx="1"/>
-          </p:nvPr>
-        </p:nvSpPr>
-        <p:spPr/>
-        <p:txBody>
-          <a:bodyPr/>
-          <a:lstStyle/>
-          <a:p>
-            <a:r>
-              <a:rPr lang="en-US" dirty="0" err="1"/>
-              <a:t>Spotipy</a:t>
-            </a:r>
-            <a:r>
-              <a:rPr lang="en-US" dirty="0"/>
-              <a:t> (the Python wrapper we relied on) does not refresh tokens automatically</a:t>
-            </a:r>
-          </a:p>
-          <a:p>
-            <a:r>
-              <a:rPr lang="en-US" dirty="0"/>
-              <a:t>Web Playback SDK is in ‘Beta’ and not fully functional. Also a crucial endpoint in the Spotify Web API seems to have an unresolved bug (opened this past June on GitHub).</a:t>
-            </a:r>
-          </a:p>
-          <a:p>
-            <a:endParaRPr lang="en-US" dirty="0"/>
-          </a:p>
-        </p:txBody>
-      </p:sp>
-    </p:spTree>
-    <p:extLst>
-      <p:ext uri="{BB962C8B-B14F-4D97-AF65-F5344CB8AC3E}">
-        <p14:creationId xmlns:p14="http://schemas.microsoft.com/office/powerpoint/2010/main" val="1147963243"/>
-      </p:ext>
-    </p:extLst>
-  </p:cSld>
-  <p:clrMapOvr>
-    <a:masterClrMapping/>
-  </p:clrMapOvr>
-</p:notes>
-</file>
-
-<file path=ppt/notesSlides/notesSlide8.xml><?xml version="1.0" encoding="utf-8"?>
-<p:notes xmlns:a="http://schemas.openxmlformats.org/drawingml/2006/main" xmlns:r="http://schemas.openxmlformats.org/officeDocument/2006/relationships" xmlns:p="http://schemas.openxmlformats.org/presentationml/2006/main" showMasterSp="0" showMasterPhAnim="0">
-  <p:cSld>
-    <p:spTree>
-      <p:nvGrpSpPr>
-        <p:cNvPr id="1" name="Shape 186"/>
-        <p:cNvGrpSpPr/>
-        <p:nvPr/>
-      </p:nvGrpSpPr>
-      <p:grpSpPr>
-        <a:xfrm>
-          <a:off x="0" y="0"/>
-          <a:ext cx="0" cy="0"/>
-          <a:chOff x="0" y="0"/>
-          <a:chExt cx="0" cy="0"/>
-        </a:xfrm>
-      </p:grpSpPr>
-      <p:sp>
-        <p:nvSpPr>
-          <p:cNvPr id="187" name="Google Shape;187;g35ed75ccf_044:notes"/>
+          <p:cNvPr id="117" name="Google Shape;117;g35f391192_045:notes"/>
           <p:cNvSpPr>
             <a:spLocks noGrp="1" noRot="1" noChangeAspect="1"/>
           </p:cNvSpPr>
@@ -1569,7 +1734,7 @@
       </p:sp>
       <p:sp>
         <p:nvSpPr>
-          <p:cNvPr id="188" name="Google Shape;188;g35ed75ccf_044:notes"/>
+          <p:cNvPr id="118" name="Google Shape;118;g35f391192_045:notes"/>
           <p:cNvSpPr txBox="1">
             <a:spLocks noGrp="1"/>
           </p:cNvSpPr>
@@ -1601,16 +1766,15 @@
               </a:spcAft>
               <a:buNone/>
             </a:pPr>
+            <a:r>
+              <a:rPr lang="en-US" dirty="0"/>
+              <a:t>Sam</a:t>
+            </a:r>
             <a:endParaRPr dirty="0"/>
           </a:p>
         </p:txBody>
       </p:sp>
     </p:spTree>
-    <p:extLst>
-      <p:ext uri="{BB962C8B-B14F-4D97-AF65-F5344CB8AC3E}">
-        <p14:creationId xmlns:p14="http://schemas.microsoft.com/office/powerpoint/2010/main" val="3415559119"/>
-      </p:ext>
-    </p:extLst>
   </p:cSld>
   <p:clrMapOvr>
     <a:masterClrMapping/>
@@ -1618,12 +1782,12 @@
 </p:notes>
 </file>
 
-<file path=ppt/notesSlides/notesSlide9.xml><?xml version="1.0" encoding="utf-8"?>
-<p:notes xmlns:a="http://schemas.openxmlformats.org/drawingml/2006/main" xmlns:r="http://schemas.openxmlformats.org/officeDocument/2006/relationships" xmlns:p="http://schemas.openxmlformats.org/presentationml/2006/main" showMasterSp="0" showMasterPhAnim="0">
+<file path=ppt/notesSlides/notesSlide7.xml><?xml version="1.0" encoding="utf-8"?>
+<p:notes xmlns:a="http://schemas.openxmlformats.org/drawingml/2006/main" xmlns:r="http://schemas.openxmlformats.org/officeDocument/2006/relationships" xmlns:p="http://schemas.openxmlformats.org/presentationml/2006/main">
   <p:cSld>
     <p:spTree>
       <p:nvGrpSpPr>
-        <p:cNvPr id="1" name="Shape 77"/>
+        <p:cNvPr id="1" name=""/>
         <p:cNvGrpSpPr/>
         <p:nvPr/>
       </p:nvGrpSpPr>
@@ -1637,12 +1801,12 @@
       </p:grpSpPr>
       <p:sp>
         <p:nvSpPr>
-          <p:cNvPr id="78" name="Google Shape;78;g35f391192_029:notes"/>
+          <p:cNvPr id="2" name="Slide Image Placeholder 1"/>
           <p:cNvSpPr>
             <a:spLocks noGrp="1" noRot="1" noChangeAspect="1"/>
           </p:cNvSpPr>
           <p:nvPr>
-            <p:ph type="sldImg" idx="2"/>
+            <p:ph type="sldImg"/>
           </p:nvPr>
         </p:nvSpPr>
         <p:spPr>
@@ -1650,71 +1814,221 @@
             <a:off x="381000" y="685800"/>
             <a:ext cx="6096000" cy="3429000"/>
           </a:xfrm>
-          <a:custGeom>
-            <a:avLst/>
-            <a:gdLst/>
-            <a:ahLst/>
-            <a:cxnLst/>
-            <a:rect l="l" t="t" r="r" b="b"/>
-            <a:pathLst>
-              <a:path w="120000" h="120000" extrusionOk="0">
-                <a:moveTo>
-                  <a:pt x="0" y="0"/>
-                </a:moveTo>
-                <a:lnTo>
-                  <a:pt x="120000" y="0"/>
-                </a:lnTo>
-                <a:lnTo>
-                  <a:pt x="120000" y="120000"/>
-                </a:lnTo>
-                <a:lnTo>
-                  <a:pt x="0" y="120000"/>
-                </a:lnTo>
-                <a:close/>
-              </a:path>
-            </a:pathLst>
-          </a:custGeom>
         </p:spPr>
       </p:sp>
       <p:sp>
         <p:nvSpPr>
-          <p:cNvPr id="79" name="Google Shape;79;g35f391192_029:notes"/>
-          <p:cNvSpPr txBox="1">
+          <p:cNvPr id="3" name="Notes Placeholder 2"/>
+          <p:cNvSpPr>
             <a:spLocks noGrp="1"/>
           </p:cNvSpPr>
           <p:nvPr>
             <p:ph type="body" idx="1"/>
           </p:nvPr>
         </p:nvSpPr>
+        <p:spPr/>
+        <p:txBody>
+          <a:bodyPr/>
+          <a:lstStyle/>
+          <a:p>
+            <a:pPr marL="139700" indent="0">
+              <a:buNone/>
+            </a:pPr>
+            <a:r>
+              <a:rPr lang="en-US" dirty="0"/>
+              <a:t>Sam</a:t>
+            </a:r>
+          </a:p>
+        </p:txBody>
+      </p:sp>
+    </p:spTree>
+    <p:extLst>
+      <p:ext uri="{BB962C8B-B14F-4D97-AF65-F5344CB8AC3E}">
+        <p14:creationId xmlns:p14="http://schemas.microsoft.com/office/powerpoint/2010/main" val="1782978580"/>
+      </p:ext>
+    </p:extLst>
+  </p:cSld>
+  <p:clrMapOvr>
+    <a:masterClrMapping/>
+  </p:clrMapOvr>
+</p:notes>
+</file>
+
+<file path=ppt/notesSlides/notesSlide8.xml><?xml version="1.0" encoding="utf-8"?>
+<p:notes xmlns:a="http://schemas.openxmlformats.org/drawingml/2006/main" xmlns:r="http://schemas.openxmlformats.org/officeDocument/2006/relationships" xmlns:p="http://schemas.openxmlformats.org/presentationml/2006/main">
+  <p:cSld>
+    <p:spTree>
+      <p:nvGrpSpPr>
+        <p:cNvPr id="1" name=""/>
+        <p:cNvGrpSpPr/>
+        <p:nvPr/>
+      </p:nvGrpSpPr>
+      <p:grpSpPr>
+        <a:xfrm>
+          <a:off x="0" y="0"/>
+          <a:ext cx="0" cy="0"/>
+          <a:chOff x="0" y="0"/>
+          <a:chExt cx="0" cy="0"/>
+        </a:xfrm>
+      </p:grpSpPr>
+      <p:sp>
+        <p:nvSpPr>
+          <p:cNvPr id="2" name="幻灯片图像占位符 1"/>
+          <p:cNvSpPr>
+            <a:spLocks noGrp="1" noRot="1" noChangeAspect="1"/>
+          </p:cNvSpPr>
+          <p:nvPr>
+            <p:ph type="sldImg"/>
+          </p:nvPr>
+        </p:nvSpPr>
         <p:spPr>
           <a:xfrm>
-            <a:off x="685800" y="4343400"/>
-            <a:ext cx="5486400" cy="4114800"/>
+            <a:off x="381000" y="685800"/>
+            <a:ext cx="6096000" cy="3429000"/>
           </a:xfrm>
-          <a:prstGeom prst="rect">
-            <a:avLst/>
-          </a:prstGeom>
         </p:spPr>
+      </p:sp>
+      <p:sp>
+        <p:nvSpPr>
+          <p:cNvPr id="3" name="备注占位符 2"/>
+          <p:cNvSpPr>
+            <a:spLocks noGrp="1"/>
+          </p:cNvSpPr>
+          <p:nvPr>
+            <p:ph type="body" idx="1"/>
+          </p:nvPr>
+        </p:nvSpPr>
+        <p:spPr/>
         <p:txBody>
-          <a:bodyPr spcFirstLastPara="1" wrap="square" lIns="91425" tIns="91425" rIns="91425" bIns="91425" anchor="t" anchorCtr="0">
-            <a:noAutofit/>
-          </a:bodyPr>
+          <a:bodyPr/>
           <a:lstStyle/>
           <a:p>
-            <a:pPr marL="0" lvl="0" indent="0" algn="l" rtl="0">
-              <a:spcBef>
-                <a:spcPts val="0"/>
-              </a:spcBef>
-              <a:spcAft>
-                <a:spcPts val="0"/>
-              </a:spcAft>
+            <a:pPr marL="139700" indent="0">
               <a:buNone/>
             </a:pPr>
-            <a:endParaRPr/>
+            <a:r>
+              <a:rPr lang="en-US" dirty="0"/>
+              <a:t>Noam</a:t>
+            </a:r>
+          </a:p>
+          <a:p>
+            <a:r>
+              <a:rPr lang="en-US" dirty="0" err="1"/>
+              <a:t>Spotipy</a:t>
+            </a:r>
+            <a:r>
+              <a:rPr lang="en-US" dirty="0"/>
+              <a:t> (the Python wrapper we relied on) does not refresh tokens automatically</a:t>
+            </a:r>
+          </a:p>
+          <a:p>
+            <a:r>
+              <a:rPr lang="en-US" dirty="0"/>
+              <a:t>Web Playback SDK is in ‘Beta’ and not fully functional. Also a crucial endpoint in the Spotify Web API seems to have an unresolved bug (opened this past June on GitHub).</a:t>
+            </a:r>
+          </a:p>
+          <a:p>
+            <a:endParaRPr lang="en-US" dirty="0"/>
           </a:p>
         </p:txBody>
       </p:sp>
     </p:spTree>
+    <p:extLst>
+      <p:ext uri="{BB962C8B-B14F-4D97-AF65-F5344CB8AC3E}">
+        <p14:creationId xmlns:p14="http://schemas.microsoft.com/office/powerpoint/2010/main" val="4174261551"/>
+      </p:ext>
+    </p:extLst>
+  </p:cSld>
+  <p:clrMapOvr>
+    <a:masterClrMapping/>
+  </p:clrMapOvr>
+</p:notes>
+</file>
+
+<file path=ppt/notesSlides/notesSlide9.xml><?xml version="1.0" encoding="utf-8"?>
+<p:notes xmlns:a="http://schemas.openxmlformats.org/drawingml/2006/main" xmlns:r="http://schemas.openxmlformats.org/officeDocument/2006/relationships" xmlns:p="http://schemas.openxmlformats.org/presentationml/2006/main">
+  <p:cSld>
+    <p:spTree>
+      <p:nvGrpSpPr>
+        <p:cNvPr id="1" name=""/>
+        <p:cNvGrpSpPr/>
+        <p:nvPr/>
+      </p:nvGrpSpPr>
+      <p:grpSpPr>
+        <a:xfrm>
+          <a:off x="0" y="0"/>
+          <a:ext cx="0" cy="0"/>
+          <a:chOff x="0" y="0"/>
+          <a:chExt cx="0" cy="0"/>
+        </a:xfrm>
+      </p:grpSpPr>
+      <p:sp>
+        <p:nvSpPr>
+          <p:cNvPr id="2" name="幻灯片图像占位符 1"/>
+          <p:cNvSpPr>
+            <a:spLocks noGrp="1" noRot="1" noChangeAspect="1"/>
+          </p:cNvSpPr>
+          <p:nvPr>
+            <p:ph type="sldImg"/>
+          </p:nvPr>
+        </p:nvSpPr>
+        <p:spPr>
+          <a:xfrm>
+            <a:off x="381000" y="685800"/>
+            <a:ext cx="6096000" cy="3429000"/>
+          </a:xfrm>
+        </p:spPr>
+      </p:sp>
+      <p:sp>
+        <p:nvSpPr>
+          <p:cNvPr id="3" name="备注占位符 2"/>
+          <p:cNvSpPr>
+            <a:spLocks noGrp="1"/>
+          </p:cNvSpPr>
+          <p:nvPr>
+            <p:ph type="body" idx="1"/>
+          </p:nvPr>
+        </p:nvSpPr>
+        <p:spPr/>
+        <p:txBody>
+          <a:bodyPr/>
+          <a:lstStyle/>
+          <a:p>
+            <a:pPr marL="139700" indent="0">
+              <a:buNone/>
+            </a:pPr>
+            <a:r>
+              <a:rPr lang="en-US" dirty="0"/>
+              <a:t>Noam</a:t>
+            </a:r>
+          </a:p>
+          <a:p>
+            <a:r>
+              <a:rPr lang="en-US" dirty="0" err="1"/>
+              <a:t>Spotipy</a:t>
+            </a:r>
+            <a:r>
+              <a:rPr lang="en-US" dirty="0"/>
+              <a:t> (the Python wrapper we relied on) does not refresh tokens automatically</a:t>
+            </a:r>
+          </a:p>
+          <a:p>
+            <a:r>
+              <a:rPr lang="en-US" dirty="0"/>
+              <a:t>Web Playback SDK is in ‘Beta’ and not fully functional. Also a crucial endpoint in the Spotify Web API seems to have an unresolved bug (opened this past June on GitHub).</a:t>
+            </a:r>
+          </a:p>
+          <a:p>
+            <a:endParaRPr lang="en-US" dirty="0"/>
+          </a:p>
+        </p:txBody>
+      </p:sp>
+    </p:spTree>
+    <p:extLst>
+      <p:ext uri="{BB962C8B-B14F-4D97-AF65-F5344CB8AC3E}">
+        <p14:creationId xmlns:p14="http://schemas.microsoft.com/office/powerpoint/2010/main" val="1147963243"/>
+      </p:ext>
+    </p:extLst>
   </p:cSld>
   <p:clrMapOvr>
     <a:masterClrMapping/>
@@ -2023,428 +2337,6 @@
 </file>
 
 <file path=ppt/slideLayouts/slideLayout2.xml><?xml version="1.0" encoding="utf-8"?>
-<p:sldLayout xmlns:a="http://schemas.openxmlformats.org/drawingml/2006/main" xmlns:r="http://schemas.openxmlformats.org/officeDocument/2006/relationships" xmlns:p="http://schemas.openxmlformats.org/presentationml/2006/main" matchingName="Subtitle">
-  <p:cSld name="TITLE_1">
-    <p:bg>
-      <p:bgPr>
-        <a:blipFill>
-          <a:blip r:embed="rId2">
-            <a:alphaModFix/>
-          </a:blip>
-          <a:stretch>
-            <a:fillRect/>
-          </a:stretch>
-        </a:blipFill>
-        <a:effectLst/>
-      </p:bgPr>
-    </p:bg>
-    <p:spTree>
-      <p:nvGrpSpPr>
-        <p:cNvPr id="1" name="Shape 12"/>
-        <p:cNvGrpSpPr/>
-        <p:nvPr/>
-      </p:nvGrpSpPr>
-      <p:grpSpPr>
-        <a:xfrm>
-          <a:off x="0" y="0"/>
-          <a:ext cx="0" cy="0"/>
-          <a:chOff x="0" y="0"/>
-          <a:chExt cx="0" cy="0"/>
-        </a:xfrm>
-      </p:grpSpPr>
-      <p:pic>
-        <p:nvPicPr>
-          <p:cNvPr id="13" name="Google Shape;13;p3" descr="paint_transparent4.png"/>
-          <p:cNvPicPr preferRelativeResize="0"/>
-          <p:nvPr/>
-        </p:nvPicPr>
-        <p:blipFill rotWithShape="1">
-          <a:blip r:embed="rId3">
-            <a:alphaModFix/>
-          </a:blip>
-          <a:srcRect r="49954"/>
-          <a:stretch/>
-        </p:blipFill>
-        <p:spPr>
-          <a:xfrm>
-            <a:off x="4567925" y="0"/>
-            <a:ext cx="4576075" cy="5143524"/>
-          </a:xfrm>
-          <a:prstGeom prst="rect">
-            <a:avLst/>
-          </a:prstGeom>
-          <a:noFill/>
-          <a:ln>
-            <a:noFill/>
-          </a:ln>
-        </p:spPr>
-      </p:pic>
-      <p:sp>
-        <p:nvSpPr>
-          <p:cNvPr id="14" name="Google Shape;14;p3"/>
-          <p:cNvSpPr/>
-          <p:nvPr/>
-        </p:nvSpPr>
-        <p:spPr>
-          <a:xfrm>
-            <a:off x="0" y="-150"/>
-            <a:ext cx="5300700" cy="5143500"/>
-          </a:xfrm>
-          <a:prstGeom prst="rect">
-            <a:avLst/>
-          </a:prstGeom>
-          <a:solidFill>
-            <a:srgbClr val="FFFFFF"/>
-          </a:solidFill>
-          <a:ln>
-            <a:noFill/>
-          </a:ln>
-        </p:spPr>
-        <p:txBody>
-          <a:bodyPr spcFirstLastPara="1" wrap="square" lIns="91425" tIns="91425" rIns="91425" bIns="91425" anchor="ctr" anchorCtr="0">
-            <a:noAutofit/>
-          </a:bodyPr>
-          <a:lstStyle/>
-          <a:p>
-            <a:pPr marL="0" lvl="0" indent="0" algn="l" rtl="0">
-              <a:spcBef>
-                <a:spcPts val="0"/>
-              </a:spcBef>
-              <a:spcAft>
-                <a:spcPts val="0"/>
-              </a:spcAft>
-              <a:buNone/>
-            </a:pPr>
-            <a:endParaRPr/>
-          </a:p>
-        </p:txBody>
-      </p:sp>
-      <p:sp>
-        <p:nvSpPr>
-          <p:cNvPr id="15" name="Google Shape;15;p3"/>
-          <p:cNvSpPr txBox="1">
-            <a:spLocks noGrp="1"/>
-          </p:cNvSpPr>
-          <p:nvPr>
-            <p:ph type="ctrTitle"/>
-          </p:nvPr>
-        </p:nvSpPr>
-        <p:spPr>
-          <a:xfrm>
-            <a:off x="685800" y="2878750"/>
-            <a:ext cx="3914700" cy="1159800"/>
-          </a:xfrm>
-          <a:prstGeom prst="rect">
-            <a:avLst/>
-          </a:prstGeom>
-        </p:spPr>
-        <p:txBody>
-          <a:bodyPr spcFirstLastPara="1" wrap="square" lIns="91425" tIns="91425" rIns="91425" bIns="91425" anchor="b" anchorCtr="0"/>
-          <a:lstStyle>
-            <a:lvl1pPr lvl="0" rtl="0">
-              <a:spcBef>
-                <a:spcPts val="0"/>
-              </a:spcBef>
-              <a:spcAft>
-                <a:spcPts val="0"/>
-              </a:spcAft>
-              <a:buSzPts val="4800"/>
-              <a:buNone/>
-              <a:defRPr sz="4800"/>
-            </a:lvl1pPr>
-            <a:lvl2pPr lvl="1" rtl="0">
-              <a:spcBef>
-                <a:spcPts val="0"/>
-              </a:spcBef>
-              <a:spcAft>
-                <a:spcPts val="0"/>
-              </a:spcAft>
-              <a:buSzPts val="4800"/>
-              <a:buNone/>
-              <a:defRPr sz="4800"/>
-            </a:lvl2pPr>
-            <a:lvl3pPr lvl="2" rtl="0">
-              <a:spcBef>
-                <a:spcPts val="0"/>
-              </a:spcBef>
-              <a:spcAft>
-                <a:spcPts val="0"/>
-              </a:spcAft>
-              <a:buSzPts val="4800"/>
-              <a:buNone/>
-              <a:defRPr sz="4800"/>
-            </a:lvl3pPr>
-            <a:lvl4pPr lvl="3" rtl="0">
-              <a:spcBef>
-                <a:spcPts val="0"/>
-              </a:spcBef>
-              <a:spcAft>
-                <a:spcPts val="0"/>
-              </a:spcAft>
-              <a:buSzPts val="4800"/>
-              <a:buNone/>
-              <a:defRPr sz="4800"/>
-            </a:lvl4pPr>
-            <a:lvl5pPr lvl="4" rtl="0">
-              <a:spcBef>
-                <a:spcPts val="0"/>
-              </a:spcBef>
-              <a:spcAft>
-                <a:spcPts val="0"/>
-              </a:spcAft>
-              <a:buSzPts val="4800"/>
-              <a:buNone/>
-              <a:defRPr sz="4800"/>
-            </a:lvl5pPr>
-            <a:lvl6pPr lvl="5" rtl="0">
-              <a:spcBef>
-                <a:spcPts val="0"/>
-              </a:spcBef>
-              <a:spcAft>
-                <a:spcPts val="0"/>
-              </a:spcAft>
-              <a:buSzPts val="4800"/>
-              <a:buNone/>
-              <a:defRPr sz="4800"/>
-            </a:lvl6pPr>
-            <a:lvl7pPr lvl="6" rtl="0">
-              <a:spcBef>
-                <a:spcPts val="0"/>
-              </a:spcBef>
-              <a:spcAft>
-                <a:spcPts val="0"/>
-              </a:spcAft>
-              <a:buSzPts val="4800"/>
-              <a:buNone/>
-              <a:defRPr sz="4800"/>
-            </a:lvl7pPr>
-            <a:lvl8pPr lvl="7" rtl="0">
-              <a:spcBef>
-                <a:spcPts val="0"/>
-              </a:spcBef>
-              <a:spcAft>
-                <a:spcPts val="0"/>
-              </a:spcAft>
-              <a:buSzPts val="4800"/>
-              <a:buNone/>
-              <a:defRPr sz="4800"/>
-            </a:lvl8pPr>
-            <a:lvl9pPr lvl="8" rtl="0">
-              <a:spcBef>
-                <a:spcPts val="0"/>
-              </a:spcBef>
-              <a:spcAft>
-                <a:spcPts val="0"/>
-              </a:spcAft>
-              <a:buSzPts val="4800"/>
-              <a:buNone/>
-              <a:defRPr sz="4800"/>
-            </a:lvl9pPr>
-          </a:lstStyle>
-          <a:p>
-            <a:endParaRPr/>
-          </a:p>
-        </p:txBody>
-      </p:sp>
-      <p:sp>
-        <p:nvSpPr>
-          <p:cNvPr id="16" name="Google Shape;16;p3"/>
-          <p:cNvSpPr txBox="1">
-            <a:spLocks noGrp="1"/>
-          </p:cNvSpPr>
-          <p:nvPr>
-            <p:ph type="subTitle" idx="1"/>
-          </p:nvPr>
-        </p:nvSpPr>
-        <p:spPr>
-          <a:xfrm>
-            <a:off x="685800" y="4135454"/>
-            <a:ext cx="3914700" cy="784800"/>
-          </a:xfrm>
-          <a:prstGeom prst="rect">
-            <a:avLst/>
-          </a:prstGeom>
-        </p:spPr>
-        <p:txBody>
-          <a:bodyPr spcFirstLastPara="1" wrap="square" lIns="91425" tIns="91425" rIns="91425" bIns="91425" anchor="t" anchorCtr="0"/>
-          <a:lstStyle>
-            <a:lvl1pPr lvl="0" rtl="0">
-              <a:spcBef>
-                <a:spcPts val="0"/>
-              </a:spcBef>
-              <a:spcAft>
-                <a:spcPts val="0"/>
-              </a:spcAft>
-              <a:buClr>
-                <a:schemeClr val="dk2"/>
-              </a:buClr>
-              <a:buSzPts val="1400"/>
-              <a:buNone/>
-              <a:defRPr sz="1400">
-                <a:solidFill>
-                  <a:schemeClr val="dk2"/>
-                </a:solidFill>
-              </a:defRPr>
-            </a:lvl1pPr>
-            <a:lvl2pPr lvl="1" rtl="0">
-              <a:spcBef>
-                <a:spcPts val="0"/>
-              </a:spcBef>
-              <a:spcAft>
-                <a:spcPts val="0"/>
-              </a:spcAft>
-              <a:buClr>
-                <a:schemeClr val="dk2"/>
-              </a:buClr>
-              <a:buSzPts val="1400"/>
-              <a:buNone/>
-              <a:defRPr sz="1400">
-                <a:solidFill>
-                  <a:schemeClr val="dk2"/>
-                </a:solidFill>
-              </a:defRPr>
-            </a:lvl2pPr>
-            <a:lvl3pPr lvl="2" rtl="0">
-              <a:spcBef>
-                <a:spcPts val="0"/>
-              </a:spcBef>
-              <a:spcAft>
-                <a:spcPts val="0"/>
-              </a:spcAft>
-              <a:buClr>
-                <a:schemeClr val="dk2"/>
-              </a:buClr>
-              <a:buSzPts val="1400"/>
-              <a:buNone/>
-              <a:defRPr sz="1400">
-                <a:solidFill>
-                  <a:schemeClr val="dk2"/>
-                </a:solidFill>
-              </a:defRPr>
-            </a:lvl3pPr>
-            <a:lvl4pPr lvl="3" rtl="0">
-              <a:spcBef>
-                <a:spcPts val="0"/>
-              </a:spcBef>
-              <a:spcAft>
-                <a:spcPts val="0"/>
-              </a:spcAft>
-              <a:buClr>
-                <a:schemeClr val="dk2"/>
-              </a:buClr>
-              <a:buSzPts val="1400"/>
-              <a:buNone/>
-              <a:defRPr sz="1400">
-                <a:solidFill>
-                  <a:schemeClr val="dk2"/>
-                </a:solidFill>
-              </a:defRPr>
-            </a:lvl4pPr>
-            <a:lvl5pPr lvl="4" rtl="0">
-              <a:spcBef>
-                <a:spcPts val="0"/>
-              </a:spcBef>
-              <a:spcAft>
-                <a:spcPts val="0"/>
-              </a:spcAft>
-              <a:buClr>
-                <a:schemeClr val="dk2"/>
-              </a:buClr>
-              <a:buSzPts val="1400"/>
-              <a:buNone/>
-              <a:defRPr sz="1400">
-                <a:solidFill>
-                  <a:schemeClr val="dk2"/>
-                </a:solidFill>
-              </a:defRPr>
-            </a:lvl5pPr>
-            <a:lvl6pPr lvl="5" rtl="0">
-              <a:spcBef>
-                <a:spcPts val="0"/>
-              </a:spcBef>
-              <a:spcAft>
-                <a:spcPts val="0"/>
-              </a:spcAft>
-              <a:buClr>
-                <a:schemeClr val="dk2"/>
-              </a:buClr>
-              <a:buSzPts val="1400"/>
-              <a:buNone/>
-              <a:defRPr sz="1400">
-                <a:solidFill>
-                  <a:schemeClr val="dk2"/>
-                </a:solidFill>
-              </a:defRPr>
-            </a:lvl6pPr>
-            <a:lvl7pPr lvl="6" rtl="0">
-              <a:spcBef>
-                <a:spcPts val="0"/>
-              </a:spcBef>
-              <a:spcAft>
-                <a:spcPts val="0"/>
-              </a:spcAft>
-              <a:buClr>
-                <a:schemeClr val="dk2"/>
-              </a:buClr>
-              <a:buSzPts val="1400"/>
-              <a:buNone/>
-              <a:defRPr sz="1400">
-                <a:solidFill>
-                  <a:schemeClr val="dk2"/>
-                </a:solidFill>
-              </a:defRPr>
-            </a:lvl7pPr>
-            <a:lvl8pPr lvl="7" rtl="0">
-              <a:spcBef>
-                <a:spcPts val="0"/>
-              </a:spcBef>
-              <a:spcAft>
-                <a:spcPts val="0"/>
-              </a:spcAft>
-              <a:buClr>
-                <a:schemeClr val="dk2"/>
-              </a:buClr>
-              <a:buSzPts val="1400"/>
-              <a:buNone/>
-              <a:defRPr sz="1400">
-                <a:solidFill>
-                  <a:schemeClr val="dk2"/>
-                </a:solidFill>
-              </a:defRPr>
-            </a:lvl8pPr>
-            <a:lvl9pPr lvl="8" rtl="0">
-              <a:spcBef>
-                <a:spcPts val="0"/>
-              </a:spcBef>
-              <a:spcAft>
-                <a:spcPts val="0"/>
-              </a:spcAft>
-              <a:buClr>
-                <a:schemeClr val="dk2"/>
-              </a:buClr>
-              <a:buSzPts val="1400"/>
-              <a:buNone/>
-              <a:defRPr sz="1400">
-                <a:solidFill>
-                  <a:schemeClr val="dk2"/>
-                </a:solidFill>
-              </a:defRPr>
-            </a:lvl9pPr>
-          </a:lstStyle>
-          <a:p>
-            <a:endParaRPr/>
-          </a:p>
-        </p:txBody>
-      </p:sp>
-    </p:spTree>
-  </p:cSld>
-  <p:clrMapOvr>
-    <a:masterClrMapping/>
-  </p:clrMapOvr>
-</p:sldLayout>
-</file>
-
-<file path=ppt/slideLayouts/slideLayout3.xml><?xml version="1.0" encoding="utf-8"?>
 <p:sldLayout xmlns:a="http://schemas.openxmlformats.org/drawingml/2006/main" xmlns:r="http://schemas.openxmlformats.org/officeDocument/2006/relationships" xmlns:p="http://schemas.openxmlformats.org/presentationml/2006/main" matchingName="Title + 2 columns" type="twoColTx">
   <p:cSld name="TITLE_AND_TWO_COLUMNS">
     <p:bg>
@@ -2970,7 +2862,7 @@
 </p:sldLayout>
 </file>
 
-<file path=ppt/slideLayouts/slideLayout4.xml><?xml version="1.0" encoding="utf-8"?>
+<file path=ppt/slideLayouts/slideLayout3.xml><?xml version="1.0" encoding="utf-8"?>
 <p:sldLayout xmlns:a="http://schemas.openxmlformats.org/drawingml/2006/main" xmlns:r="http://schemas.openxmlformats.org/officeDocument/2006/relationships" xmlns:p="http://schemas.openxmlformats.org/presentationml/2006/main" matchingName="Title + 3 columns">
   <p:cSld name="TITLE_AND_TWO_COLUMNS_1">
     <p:bg>
@@ -3623,7 +3515,7 @@
 </p:sldLayout>
 </file>
 
-<file path=ppt/slideLayouts/slideLayout5.xml><?xml version="1.0" encoding="utf-8"?>
+<file path=ppt/slideLayouts/slideLayout4.xml><?xml version="1.0" encoding="utf-8"?>
 <p:sldLayout xmlns:a="http://schemas.openxmlformats.org/drawingml/2006/main" xmlns:r="http://schemas.openxmlformats.org/officeDocument/2006/relationships" xmlns:p="http://schemas.openxmlformats.org/presentationml/2006/main" matchingName="Title only" type="titleOnly">
   <p:cSld name="TITLE_ONLY">
     <p:bg>
@@ -3895,7 +3787,7 @@
 </p:sldLayout>
 </file>
 
-<file path=ppt/slideLayouts/slideLayout6.xml><?xml version="1.0" encoding="utf-8"?>
+<file path=ppt/slideLayouts/slideLayout5.xml><?xml version="1.0" encoding="utf-8"?>
 <p:sldLayout xmlns:a="http://schemas.openxmlformats.org/drawingml/2006/main" xmlns:r="http://schemas.openxmlformats.org/officeDocument/2006/relationships" xmlns:p="http://schemas.openxmlformats.org/presentationml/2006/main" matchingName="Caption">
   <p:cSld name="CAPTION_ONLY">
     <p:bg>
@@ -4079,7 +3971,7 @@
 </p:sldLayout>
 </file>
 
-<file path=ppt/slideLayouts/slideLayout7.xml><?xml version="1.0" encoding="utf-8"?>
+<file path=ppt/slideLayouts/slideLayout6.xml><?xml version="1.0" encoding="utf-8"?>
 <p:sldLayout xmlns:a="http://schemas.openxmlformats.org/drawingml/2006/main" xmlns:r="http://schemas.openxmlformats.org/officeDocument/2006/relationships" xmlns:p="http://schemas.openxmlformats.org/presentationml/2006/main" matchingName="Blank circle" type="blank">
   <p:cSld name="BLANK">
     <p:bg>
@@ -4224,7 +4116,7 @@
 </p:sldLayout>
 </file>
 
-<file path=ppt/slideLayouts/slideLayout8.xml><?xml version="1.0" encoding="utf-8"?>
+<file path=ppt/slideLayouts/slideLayout7.xml><?xml version="1.0" encoding="utf-8"?>
 <p:sldLayout xmlns:a="http://schemas.openxmlformats.org/drawingml/2006/main" xmlns:r="http://schemas.openxmlformats.org/officeDocument/2006/relationships" xmlns:p="http://schemas.openxmlformats.org/presentationml/2006/main" matchingName="Blank rectangle">
   <p:cSld name="BLANK_1">
     <p:bg>
@@ -5068,13 +4960,12 @@
   <p:clrMap bg1="lt1" tx1="dk1" bg2="dk2" tx2="lt2" accent1="accent1" accent2="accent2" accent3="accent3" accent4="accent4" accent5="accent5" accent6="accent6" hlink="hlink" folHlink="folHlink"/>
   <p:sldLayoutIdLst>
     <p:sldLayoutId id="2147483648" r:id="rId1"/>
-    <p:sldLayoutId id="2147483649" r:id="rId2"/>
-    <p:sldLayoutId id="2147483652" r:id="rId3"/>
-    <p:sldLayoutId id="2147483653" r:id="rId4"/>
-    <p:sldLayoutId id="2147483654" r:id="rId5"/>
-    <p:sldLayoutId id="2147483655" r:id="rId6"/>
-    <p:sldLayoutId id="2147483656" r:id="rId7"/>
-    <p:sldLayoutId id="2147483657" r:id="rId8"/>
+    <p:sldLayoutId id="2147483652" r:id="rId2"/>
+    <p:sldLayoutId id="2147483653" r:id="rId3"/>
+    <p:sldLayoutId id="2147483654" r:id="rId4"/>
+    <p:sldLayoutId id="2147483655" r:id="rId5"/>
+    <p:sldLayoutId id="2147483656" r:id="rId6"/>
+    <p:sldLayoutId id="2147483657" r:id="rId7"/>
   </p:sldLayoutIdLst>
   <p:transition>
     <p:fade thruBlk="1"/>
@@ -6612,115 +6503,6 @@
   <p:cSld>
     <p:spTree>
       <p:nvGrpSpPr>
-        <p:cNvPr id="1" name="Shape 80"/>
-        <p:cNvGrpSpPr/>
-        <p:nvPr/>
-      </p:nvGrpSpPr>
-      <p:grpSpPr>
-        <a:xfrm>
-          <a:off x="0" y="0"/>
-          <a:ext cx="0" cy="0"/>
-          <a:chOff x="0" y="0"/>
-          <a:chExt cx="0" cy="0"/>
-        </a:xfrm>
-      </p:grpSpPr>
-      <p:sp>
-        <p:nvSpPr>
-          <p:cNvPr id="81" name="Google Shape;81;p16"/>
-          <p:cNvSpPr txBox="1">
-            <a:spLocks noGrp="1"/>
-          </p:cNvSpPr>
-          <p:nvPr>
-            <p:ph type="ctrTitle"/>
-          </p:nvPr>
-        </p:nvSpPr>
-        <p:spPr>
-          <a:xfrm>
-            <a:off x="685799" y="2424223"/>
-            <a:ext cx="4176823" cy="1614327"/>
-          </a:xfrm>
-          <a:prstGeom prst="rect">
-            <a:avLst/>
-          </a:prstGeom>
-        </p:spPr>
-        <p:txBody>
-          <a:bodyPr spcFirstLastPara="1" wrap="square" lIns="91425" tIns="91425" rIns="91425" bIns="91425" anchor="b" anchorCtr="0">
-            <a:noAutofit/>
-          </a:bodyPr>
-          <a:lstStyle/>
-          <a:p>
-            <a:pPr marL="0" lvl="0" indent="0" algn="l" rtl="0">
-              <a:spcBef>
-                <a:spcPts val="0"/>
-              </a:spcBef>
-              <a:spcAft>
-                <a:spcPts val="0"/>
-              </a:spcAft>
-              <a:buNone/>
-            </a:pPr>
-            <a:r>
-              <a:rPr lang="en-US" dirty="0"/>
-              <a:t>Moving on to Next Week</a:t>
-            </a:r>
-            <a:endParaRPr dirty="0"/>
-          </a:p>
-        </p:txBody>
-      </p:sp>
-      <p:sp>
-        <p:nvSpPr>
-          <p:cNvPr id="83" name="Google Shape;83;p16"/>
-          <p:cNvSpPr txBox="1">
-            <a:spLocks noGrp="1"/>
-          </p:cNvSpPr>
-          <p:nvPr>
-            <p:ph type="sldNum" idx="4294967295"/>
-          </p:nvPr>
-        </p:nvSpPr>
-        <p:spPr>
-          <a:xfrm>
-            <a:off x="8480584" y="4673651"/>
-            <a:ext cx="548700" cy="393600"/>
-          </a:xfrm>
-          <a:prstGeom prst="rect">
-            <a:avLst/>
-          </a:prstGeom>
-        </p:spPr>
-        <p:txBody>
-          <a:bodyPr spcFirstLastPara="1" wrap="square" lIns="91425" tIns="91425" rIns="91425" bIns="91425" anchor="ctr" anchorCtr="0">
-            <a:noAutofit/>
-          </a:bodyPr>
-          <a:lstStyle/>
-          <a:p>
-            <a:pPr marL="0" lvl="0" indent="0" algn="r" rtl="0">
-              <a:spcBef>
-                <a:spcPts val="0"/>
-              </a:spcBef>
-              <a:spcAft>
-                <a:spcPts val="0"/>
-              </a:spcAft>
-              <a:buNone/>
-            </a:pPr>
-            <a:fld id="{00000000-1234-1234-1234-123412341234}" type="slidenum">
-              <a:rPr lang="en"/>
-              <a:t>11</a:t>
-            </a:fld>
-            <a:endParaRPr/>
-          </a:p>
-        </p:txBody>
-      </p:sp>
-    </p:spTree>
-  </p:cSld>
-  <p:clrMapOvr>
-    <a:masterClrMapping/>
-  </p:clrMapOvr>
-</p:sld>
-</file>
-
-<file path=ppt/slides/slide12.xml><?xml version="1.0" encoding="utf-8"?>
-<p:sld xmlns:a="http://schemas.openxmlformats.org/drawingml/2006/main" xmlns:r="http://schemas.openxmlformats.org/officeDocument/2006/relationships" xmlns:p="http://schemas.openxmlformats.org/presentationml/2006/main">
-  <p:cSld>
-    <p:spTree>
-      <p:nvGrpSpPr>
         <p:cNvPr id="1" name=""/>
         <p:cNvGrpSpPr/>
         <p:nvPr/>
@@ -6765,7 +6547,7 @@
             </a:pPr>
             <a:fld id="{00000000-1234-1234-1234-123412341234}" type="slidenum">
               <a:rPr lang="en" smtClean="0"/>
-              <a:t>12</a:t>
+              <a:t>11</a:t>
             </a:fld>
             <a:endParaRPr lang="en"/>
           </a:p>
@@ -7508,7 +7290,7 @@
 </p:sld>
 </file>
 
-<file path=ppt/slides/slide13.xml><?xml version="1.0" encoding="utf-8"?>
+<file path=ppt/slides/slide12.xml><?xml version="1.0" encoding="utf-8"?>
 <p:sld xmlns:a="http://schemas.openxmlformats.org/drawingml/2006/main" xmlns:r="http://schemas.openxmlformats.org/officeDocument/2006/relationships" xmlns:p="http://schemas.openxmlformats.org/presentationml/2006/main">
   <p:cSld>
     <p:spTree>
@@ -7608,7 +7390,7 @@
             </a:pPr>
             <a:fld id="{00000000-1234-1234-1234-123412341234}" type="slidenum">
               <a:rPr lang="en" smtClean="0"/>
-              <a:t>13</a:t>
+              <a:t>12</a:t>
             </a:fld>
             <a:endParaRPr lang="en"/>
           </a:p>
@@ -7735,7 +7517,7 @@
 </p:sld>
 </file>
 
-<file path=ppt/slides/slide14.xml><?xml version="1.0" encoding="utf-8"?>
+<file path=ppt/slides/slide13.xml><?xml version="1.0" encoding="utf-8"?>
 <p:sld xmlns:a="http://schemas.openxmlformats.org/drawingml/2006/main" xmlns:r="http://schemas.openxmlformats.org/officeDocument/2006/relationships" xmlns:p="http://schemas.openxmlformats.org/presentationml/2006/main">
   <p:cSld>
     <p:bg>
@@ -7901,7 +7683,7 @@
             </a:pPr>
             <a:fld id="{00000000-1234-1234-1234-123412341234}" type="slidenum">
               <a:rPr lang="en"/>
-              <a:t>14</a:t>
+              <a:t>13</a:t>
             </a:fld>
             <a:endParaRPr/>
           </a:p>
@@ -11789,7 +11571,7 @@
         </p:nvSpPr>
         <p:spPr>
           <a:xfrm>
-            <a:off x="368346" y="2071202"/>
+            <a:off x="205740" y="2807472"/>
             <a:ext cx="3181678" cy="2799249"/>
           </a:xfrm>
         </p:spPr>
@@ -11802,7 +11584,7 @@
             </a:pPr>
             <a:r>
               <a:rPr lang="en-US" sz="2000" b="1" dirty="0"/>
-              <a:t>Problems </a:t>
+              <a:t>Initial Try: </a:t>
             </a:r>
           </a:p>
           <a:p>
@@ -11831,7 +11613,7 @@
         </p:nvSpPr>
         <p:spPr>
           <a:xfrm>
-            <a:off x="3451412" y="2071202"/>
+            <a:off x="3387418" y="1424604"/>
             <a:ext cx="4153934" cy="797247"/>
           </a:xfrm>
         </p:spPr>
@@ -11863,6 +11645,16 @@
             <a:r>
               <a:rPr lang="en-US" sz="1800" dirty="0"/>
               <a:t>'Listeners' receive player state change and adjust their playback</a:t>
+            </a:r>
+          </a:p>
+          <a:p>
+            <a:r>
+              <a:rPr lang="en-US" sz="1800" dirty="0"/>
+              <a:t>Currently using </a:t>
+            </a:r>
+            <a:r>
+              <a:rPr lang="en-US" sz="1800" i="1" dirty="0"/>
+              <a:t>hard-coded offset</a:t>
             </a:r>
           </a:p>
         </p:txBody>
@@ -11907,46 +11699,293 @@
       </p:sp>
       <p:sp>
         <p:nvSpPr>
-          <p:cNvPr id="6" name="文本框 5">
+          <p:cNvPr id="9" name="文本占位符 2">
             <a:extLst>
               <a:ext uri="{FF2B5EF4-FFF2-40B4-BE49-F238E27FC236}">
-                <a16:creationId xmlns:a16="http://schemas.microsoft.com/office/drawing/2014/main" id="{10860342-D7BB-4487-8DFF-3618F0EB5B03}"/>
+                <a16:creationId xmlns:a16="http://schemas.microsoft.com/office/drawing/2014/main" id="{7571C6B8-27E8-F74D-9EC5-3D0BAFBCB93F}"/>
               </a:ext>
             </a:extLst>
           </p:cNvPr>
-          <p:cNvSpPr txBox="1"/>
+          <p:cNvSpPr txBox="1">
+            <a:spLocks/>
+          </p:cNvSpPr>
           <p:nvPr/>
         </p:nvSpPr>
         <p:spPr>
           <a:xfrm>
-            <a:off x="1070342" y="1375144"/>
-            <a:ext cx="5642345" cy="461665"/>
+            <a:off x="368346" y="1424604"/>
+            <a:ext cx="3181678" cy="2799249"/>
           </a:xfrm>
           <a:prstGeom prst="rect">
             <a:avLst/>
           </a:prstGeom>
           <a:noFill/>
+          <a:ln>
+            <a:noFill/>
+          </a:ln>
         </p:spPr>
         <p:txBody>
-          <a:bodyPr wrap="square" rtlCol="0">
-            <a:spAutoFit/>
-          </a:bodyPr>
-          <a:lstStyle/>
-          <a:p>
-            <a:pPr marL="285750" indent="-285750">
-              <a:buFont typeface="Arial" panose="020B0604020202020204" pitchFamily="34" charset="0"/>
-              <a:buChar char="•"/>
+          <a:bodyPr spcFirstLastPara="1" wrap="square" lIns="91425" tIns="91425" rIns="91425" bIns="91425" anchor="t" anchorCtr="0"/>
+          <a:lstStyle>
+            <a:defPPr marR="0" lvl="0" algn="l" rtl="0">
+              <a:lnSpc>
+                <a:spcPct val="100000"/>
+              </a:lnSpc>
+              <a:spcBef>
+                <a:spcPts val="0"/>
+              </a:spcBef>
+              <a:spcAft>
+                <a:spcPts val="0"/>
+              </a:spcAft>
+            </a:defPPr>
+            <a:lvl1pPr marL="457200" marR="0" lvl="0" indent="-330200" algn="l" rtl="0">
+              <a:lnSpc>
+                <a:spcPct val="100000"/>
+              </a:lnSpc>
+              <a:spcBef>
+                <a:spcPts val="600"/>
+              </a:spcBef>
+              <a:spcAft>
+                <a:spcPts val="0"/>
+              </a:spcAft>
+              <a:buClr>
+                <a:srgbClr val="B7B7B7"/>
+              </a:buClr>
+              <a:buSzPts val="1600"/>
+              <a:buFont typeface="Lato Light"/>
+              <a:buChar char="×"/>
+              <a:defRPr sz="1600" b="0" i="0" u="none" strike="noStrike" cap="none">
+                <a:solidFill>
+                  <a:srgbClr val="666666"/>
+                </a:solidFill>
+                <a:latin typeface="Lato Light"/>
+                <a:ea typeface="Lato Light"/>
+                <a:cs typeface="Lato Light"/>
+                <a:sym typeface="Lato Light"/>
+              </a:defRPr>
+            </a:lvl1pPr>
+            <a:lvl2pPr marL="914400" marR="0" lvl="1" indent="-330200" algn="l" rtl="0">
+              <a:lnSpc>
+                <a:spcPct val="100000"/>
+              </a:lnSpc>
+              <a:spcBef>
+                <a:spcPts val="0"/>
+              </a:spcBef>
+              <a:spcAft>
+                <a:spcPts val="0"/>
+              </a:spcAft>
+              <a:buClr>
+                <a:srgbClr val="B7B7B7"/>
+              </a:buClr>
+              <a:buSzPts val="1600"/>
+              <a:buFont typeface="Lato Light"/>
+              <a:buChar char="×"/>
+              <a:defRPr sz="1600" b="0" i="0" u="none" strike="noStrike" cap="none">
+                <a:solidFill>
+                  <a:srgbClr val="666666"/>
+                </a:solidFill>
+                <a:latin typeface="Lato Light"/>
+                <a:ea typeface="Lato Light"/>
+                <a:cs typeface="Lato Light"/>
+                <a:sym typeface="Lato Light"/>
+              </a:defRPr>
+            </a:lvl2pPr>
+            <a:lvl3pPr marL="1371600" marR="0" lvl="2" indent="-330200" algn="l" rtl="0">
+              <a:lnSpc>
+                <a:spcPct val="100000"/>
+              </a:lnSpc>
+              <a:spcBef>
+                <a:spcPts val="0"/>
+              </a:spcBef>
+              <a:spcAft>
+                <a:spcPts val="0"/>
+              </a:spcAft>
+              <a:buClr>
+                <a:srgbClr val="B7B7B7"/>
+              </a:buClr>
+              <a:buSzPts val="1600"/>
+              <a:buFont typeface="Lato Light"/>
+              <a:buChar char="×"/>
+              <a:defRPr sz="1600" b="0" i="0" u="none" strike="noStrike" cap="none">
+                <a:solidFill>
+                  <a:srgbClr val="666666"/>
+                </a:solidFill>
+                <a:latin typeface="Lato Light"/>
+                <a:ea typeface="Lato Light"/>
+                <a:cs typeface="Lato Light"/>
+                <a:sym typeface="Lato Light"/>
+              </a:defRPr>
+            </a:lvl3pPr>
+            <a:lvl4pPr marL="1828800" marR="0" lvl="3" indent="-330200" algn="l" rtl="0">
+              <a:lnSpc>
+                <a:spcPct val="100000"/>
+              </a:lnSpc>
+              <a:spcBef>
+                <a:spcPts val="0"/>
+              </a:spcBef>
+              <a:spcAft>
+                <a:spcPts val="0"/>
+              </a:spcAft>
+              <a:buClr>
+                <a:srgbClr val="B7B7B7"/>
+              </a:buClr>
+              <a:buSzPts val="1600"/>
+              <a:buFont typeface="Lato Light"/>
+              <a:buChar char="×"/>
+              <a:defRPr sz="1600" b="0" i="0" u="none" strike="noStrike" cap="none">
+                <a:solidFill>
+                  <a:srgbClr val="666666"/>
+                </a:solidFill>
+                <a:latin typeface="Lato Light"/>
+                <a:ea typeface="Lato Light"/>
+                <a:cs typeface="Lato Light"/>
+                <a:sym typeface="Lato Light"/>
+              </a:defRPr>
+            </a:lvl4pPr>
+            <a:lvl5pPr marL="2286000" marR="0" lvl="4" indent="-330200" algn="l" rtl="0">
+              <a:lnSpc>
+                <a:spcPct val="100000"/>
+              </a:lnSpc>
+              <a:spcBef>
+                <a:spcPts val="0"/>
+              </a:spcBef>
+              <a:spcAft>
+                <a:spcPts val="0"/>
+              </a:spcAft>
+              <a:buClr>
+                <a:srgbClr val="B7B7B7"/>
+              </a:buClr>
+              <a:buSzPts val="1600"/>
+              <a:buFont typeface="Lato Light"/>
+              <a:buChar char="○"/>
+              <a:defRPr sz="1600" b="0" i="0" u="none" strike="noStrike" cap="none">
+                <a:solidFill>
+                  <a:srgbClr val="666666"/>
+                </a:solidFill>
+                <a:latin typeface="Lato Light"/>
+                <a:ea typeface="Lato Light"/>
+                <a:cs typeface="Lato Light"/>
+                <a:sym typeface="Lato Light"/>
+              </a:defRPr>
+            </a:lvl5pPr>
+            <a:lvl6pPr marL="2743200" marR="0" lvl="5" indent="-330200" algn="l" rtl="0">
+              <a:lnSpc>
+                <a:spcPct val="100000"/>
+              </a:lnSpc>
+              <a:spcBef>
+                <a:spcPts val="0"/>
+              </a:spcBef>
+              <a:spcAft>
+                <a:spcPts val="0"/>
+              </a:spcAft>
+              <a:buClr>
+                <a:srgbClr val="B7B7B7"/>
+              </a:buClr>
+              <a:buSzPts val="1600"/>
+              <a:buFont typeface="Lato Light"/>
+              <a:buChar char="■"/>
+              <a:defRPr sz="1600" b="0" i="0" u="none" strike="noStrike" cap="none">
+                <a:solidFill>
+                  <a:srgbClr val="666666"/>
+                </a:solidFill>
+                <a:latin typeface="Lato Light"/>
+                <a:ea typeface="Lato Light"/>
+                <a:cs typeface="Lato Light"/>
+                <a:sym typeface="Lato Light"/>
+              </a:defRPr>
+            </a:lvl6pPr>
+            <a:lvl7pPr marL="3200400" marR="0" lvl="6" indent="-330200" algn="l" rtl="0">
+              <a:lnSpc>
+                <a:spcPct val="100000"/>
+              </a:lnSpc>
+              <a:spcBef>
+                <a:spcPts val="0"/>
+              </a:spcBef>
+              <a:spcAft>
+                <a:spcPts val="0"/>
+              </a:spcAft>
+              <a:buClr>
+                <a:srgbClr val="B7B7B7"/>
+              </a:buClr>
+              <a:buSzPts val="1600"/>
+              <a:buFont typeface="Lato Light"/>
+              <a:buChar char="●"/>
+              <a:defRPr sz="1600" b="0" i="0" u="none" strike="noStrike" cap="none">
+                <a:solidFill>
+                  <a:srgbClr val="666666"/>
+                </a:solidFill>
+                <a:latin typeface="Lato Light"/>
+                <a:ea typeface="Lato Light"/>
+                <a:cs typeface="Lato Light"/>
+                <a:sym typeface="Lato Light"/>
+              </a:defRPr>
+            </a:lvl7pPr>
+            <a:lvl8pPr marL="3657600" marR="0" lvl="7" indent="-330200" algn="l" rtl="0">
+              <a:lnSpc>
+                <a:spcPct val="100000"/>
+              </a:lnSpc>
+              <a:spcBef>
+                <a:spcPts val="0"/>
+              </a:spcBef>
+              <a:spcAft>
+                <a:spcPts val="0"/>
+              </a:spcAft>
+              <a:buClr>
+                <a:srgbClr val="B7B7B7"/>
+              </a:buClr>
+              <a:buSzPts val="1600"/>
+              <a:buFont typeface="Lato Light"/>
+              <a:buChar char="○"/>
+              <a:defRPr sz="1600" b="0" i="0" u="none" strike="noStrike" cap="none">
+                <a:solidFill>
+                  <a:srgbClr val="666666"/>
+                </a:solidFill>
+                <a:latin typeface="Lato Light"/>
+                <a:ea typeface="Lato Light"/>
+                <a:cs typeface="Lato Light"/>
+                <a:sym typeface="Lato Light"/>
+              </a:defRPr>
+            </a:lvl8pPr>
+            <a:lvl9pPr marL="4114800" marR="0" lvl="8" indent="-330200" algn="l" rtl="0">
+              <a:lnSpc>
+                <a:spcPct val="100000"/>
+              </a:lnSpc>
+              <a:spcBef>
+                <a:spcPts val="0"/>
+              </a:spcBef>
+              <a:spcAft>
+                <a:spcPts val="0"/>
+              </a:spcAft>
+              <a:buClr>
+                <a:srgbClr val="B7B7B7"/>
+              </a:buClr>
+              <a:buSzPts val="1600"/>
+              <a:buFont typeface="Lato Light"/>
+              <a:buChar char="■"/>
+              <a:defRPr sz="1600" b="0" i="0" u="none" strike="noStrike" cap="none">
+                <a:solidFill>
+                  <a:srgbClr val="666666"/>
+                </a:solidFill>
+                <a:latin typeface="Lato Light"/>
+                <a:ea typeface="Lato Light"/>
+                <a:cs typeface="Lato Light"/>
+                <a:sym typeface="Lato Light"/>
+              </a:defRPr>
+            </a:lvl9pPr>
+          </a:lstStyle>
+          <a:p>
+            <a:pPr marL="127000" indent="0">
+              <a:buFont typeface="Lato Light"/>
+              <a:buNone/>
             </a:pPr>
             <a:r>
-              <a:rPr lang="en-US" sz="2400" dirty="0">
-                <a:solidFill>
-                  <a:schemeClr val="bg2">
-                    <a:lumMod val="60000"/>
-                    <a:lumOff val="40000"/>
-                  </a:schemeClr>
-                </a:solidFill>
-                <a:latin typeface="Lato" panose="020F0502020204030203" pitchFamily="34" charset="0"/>
-              </a:rPr>
+              <a:rPr lang="en-US" sz="2000" b="1" dirty="0"/>
+              <a:t>Problem</a:t>
+            </a:r>
+          </a:p>
+          <a:p>
+            <a:r>
+              <a:rPr lang="en-US" sz="1800" dirty="0"/>
               <a:t>Synchronizing playback was difficult</a:t>
             </a:r>
           </a:p>
@@ -12335,6 +12374,12 @@
             <a:r>
               <a:rPr lang="en-US" sz="1800" dirty="0"/>
               <a:t>Everything in AJAX! So it won’t force user to refresh the page and stop playback.</a:t>
+            </a:r>
+          </a:p>
+          <a:p>
+            <a:r>
+              <a:rPr lang="en-US" sz="1800" dirty="0"/>
+              <a:t>Currently doing periodic update for song pool and song queue (like HW5 comments)</a:t>
             </a:r>
           </a:p>
         </p:txBody>

</xml_diff>